<commit_message>
Added descripttion for presentation for PPR
</commit_message>
<xml_diff>
--- a/5kurs/graf/Tem521PPRpresent.pptx
+++ b/5kurs/graf/Tem521PPRpresent.pptx
@@ -8,6 +8,10 @@
     <p:sldId id="256" r:id="rId2"/>
     <p:sldId id="257" r:id="rId3"/>
     <p:sldId id="258" r:id="rId4"/>
+    <p:sldId id="259" r:id="rId5"/>
+    <p:sldId id="260" r:id="rId6"/>
+    <p:sldId id="261" r:id="rId7"/>
+    <p:sldId id="262" r:id="rId8"/>
   </p:sldIdLst>
   <p:sldSz cx="9144000" cy="6858000" type="screen4x3"/>
   <p:notesSz cx="6858000" cy="9144000"/>
@@ -1065,14 +1069,35 @@
         </dgm:presLayoutVars>
       </dgm:prSet>
       <dgm:spPr/>
+      <dgm:t>
+        <a:bodyPr/>
+        <a:lstStyle/>
+        <a:p>
+          <a:endParaRPr lang="ru-RU"/>
+        </a:p>
+      </dgm:t>
     </dgm:pt>
     <dgm:pt modelId="{2AB0E042-8A5C-479B-B0E7-62403C6D1687}" type="pres">
       <dgm:prSet presAssocID="{1746C91F-4B1F-4465-8175-98C05733A160}" presName="centerShape" presStyleLbl="node0" presStyleIdx="0" presStyleCnt="1"/>
       <dgm:spPr/>
+      <dgm:t>
+        <a:bodyPr/>
+        <a:lstStyle/>
+        <a:p>
+          <a:endParaRPr lang="ru-RU"/>
+        </a:p>
+      </dgm:t>
     </dgm:pt>
     <dgm:pt modelId="{BB1E94A0-5804-4B43-9360-E371ADA41282}" type="pres">
       <dgm:prSet presAssocID="{119037E7-367B-4BFF-81C2-7B84EFC3B8DD}" presName="parTrans" presStyleLbl="bgSibTrans2D1" presStyleIdx="0" presStyleCnt="4"/>
       <dgm:spPr/>
+      <dgm:t>
+        <a:bodyPr/>
+        <a:lstStyle/>
+        <a:p>
+          <a:endParaRPr lang="ru-RU"/>
+        </a:p>
+      </dgm:t>
     </dgm:pt>
     <dgm:pt modelId="{78A56745-F5CC-455A-81AA-BB47AA406921}" type="pres">
       <dgm:prSet presAssocID="{F5D6D4A5-34D2-43C5-AE6D-36E68EF94C99}" presName="node" presStyleLbl="node1" presStyleIdx="0" presStyleCnt="4">
@@ -1092,6 +1117,13 @@
     <dgm:pt modelId="{26B48DFA-D4F4-40A8-80A3-8C01DB2C5213}" type="pres">
       <dgm:prSet presAssocID="{9AF1024E-DD2A-4455-AAA2-03C0A76D35D4}" presName="parTrans" presStyleLbl="bgSibTrans2D1" presStyleIdx="1" presStyleCnt="4"/>
       <dgm:spPr/>
+      <dgm:t>
+        <a:bodyPr/>
+        <a:lstStyle/>
+        <a:p>
+          <a:endParaRPr lang="ru-RU"/>
+        </a:p>
+      </dgm:t>
     </dgm:pt>
     <dgm:pt modelId="{A42930F9-467B-44B9-9846-00B21B70EE2D}" type="pres">
       <dgm:prSet presAssocID="{27356A8B-E80E-466D-A4B0-B3AEE2D62B7C}" presName="node" presStyleLbl="node1" presStyleIdx="1" presStyleCnt="4">
@@ -1100,10 +1132,24 @@
         </dgm:presLayoutVars>
       </dgm:prSet>
       <dgm:spPr/>
+      <dgm:t>
+        <a:bodyPr/>
+        <a:lstStyle/>
+        <a:p>
+          <a:endParaRPr lang="ru-RU"/>
+        </a:p>
+      </dgm:t>
     </dgm:pt>
     <dgm:pt modelId="{8FCD3254-982B-4916-891C-275BF1D14115}" type="pres">
       <dgm:prSet presAssocID="{9C5A01B0-D8B7-4D7E-8FB5-E2586C7FEBFC}" presName="parTrans" presStyleLbl="bgSibTrans2D1" presStyleIdx="2" presStyleCnt="4"/>
       <dgm:spPr/>
+      <dgm:t>
+        <a:bodyPr/>
+        <a:lstStyle/>
+        <a:p>
+          <a:endParaRPr lang="ru-RU"/>
+        </a:p>
+      </dgm:t>
     </dgm:pt>
     <dgm:pt modelId="{CD8C6F4E-C072-45FC-934B-46D50ACB01B1}" type="pres">
       <dgm:prSet presAssocID="{BE11D951-3C1B-4DC3-A801-B178DAB2D39F}" presName="node" presStyleLbl="node1" presStyleIdx="2" presStyleCnt="4">
@@ -1123,6 +1169,13 @@
     <dgm:pt modelId="{D77BE649-1BEA-4DDF-8B25-085177C1946B}" type="pres">
       <dgm:prSet presAssocID="{4067613B-1207-4E98-84C1-E6E3ECC9B915}" presName="parTrans" presStyleLbl="bgSibTrans2D1" presStyleIdx="3" presStyleCnt="4"/>
       <dgm:spPr/>
+      <dgm:t>
+        <a:bodyPr/>
+        <a:lstStyle/>
+        <a:p>
+          <a:endParaRPr lang="ru-RU"/>
+        </a:p>
+      </dgm:t>
     </dgm:pt>
     <dgm:pt modelId="{CBFADEF7-5F44-4A16-B0D7-94E014C0862A}" type="pres">
       <dgm:prSet presAssocID="{86908134-5176-4445-B54E-01F2400E2233}" presName="node" presStyleLbl="node1" presStyleIdx="3" presStyleCnt="4">
@@ -3124,7 +3177,7 @@
             <a:fld id="{5B106E36-FD25-4E2D-B0AA-010F637433A0}" type="datetimeFigureOut">
               <a:rPr lang="ru-RU" smtClean="0"/>
               <a:pPr/>
-              <a:t>11.01.2016</a:t>
+              <a:t>13.01.2016</a:t>
             </a:fld>
             <a:endParaRPr lang="ru-RU"/>
           </a:p>
@@ -3309,7 +3362,7 @@
             <a:fld id="{5B106E36-FD25-4E2D-B0AA-010F637433A0}" type="datetimeFigureOut">
               <a:rPr lang="ru-RU" smtClean="0"/>
               <a:pPr/>
-              <a:t>11.01.2016</a:t>
+              <a:t>13.01.2016</a:t>
             </a:fld>
             <a:endParaRPr lang="ru-RU"/>
           </a:p>
@@ -3486,7 +3539,7 @@
             <a:fld id="{5B106E36-FD25-4E2D-B0AA-010F637433A0}" type="datetimeFigureOut">
               <a:rPr lang="ru-RU" smtClean="0"/>
               <a:pPr/>
-              <a:t>11.01.2016</a:t>
+              <a:t>13.01.2016</a:t>
             </a:fld>
             <a:endParaRPr lang="ru-RU"/>
           </a:p>
@@ -3653,7 +3706,7 @@
             <a:fld id="{5B106E36-FD25-4E2D-B0AA-010F637433A0}" type="datetimeFigureOut">
               <a:rPr lang="ru-RU" smtClean="0"/>
               <a:pPr/>
-              <a:t>11.01.2016</a:t>
+              <a:t>13.01.2016</a:t>
             </a:fld>
             <a:endParaRPr lang="ru-RU"/>
           </a:p>
@@ -3876,7 +3929,7 @@
             <a:fld id="{5B106E36-FD25-4E2D-B0AA-010F637433A0}" type="datetimeFigureOut">
               <a:rPr lang="ru-RU" smtClean="0"/>
               <a:pPr/>
-              <a:t>11.01.2016</a:t>
+              <a:t>13.01.2016</a:t>
             </a:fld>
             <a:endParaRPr lang="ru-RU"/>
           </a:p>
@@ -4137,7 +4190,7 @@
             <a:fld id="{5B106E36-FD25-4E2D-B0AA-010F637433A0}" type="datetimeFigureOut">
               <a:rPr lang="ru-RU" smtClean="0"/>
               <a:pPr/>
-              <a:t>11.01.2016</a:t>
+              <a:t>13.01.2016</a:t>
             </a:fld>
             <a:endParaRPr lang="ru-RU"/>
           </a:p>
@@ -4543,7 +4596,7 @@
             <a:fld id="{5B106E36-FD25-4E2D-B0AA-010F637433A0}" type="datetimeFigureOut">
               <a:rPr lang="ru-RU" smtClean="0"/>
               <a:pPr/>
-              <a:t>11.01.2016</a:t>
+              <a:t>13.01.2016</a:t>
             </a:fld>
             <a:endParaRPr lang="ru-RU"/>
           </a:p>
@@ -4676,7 +4729,7 @@
             <a:fld id="{5B106E36-FD25-4E2D-B0AA-010F637433A0}" type="datetimeFigureOut">
               <a:rPr lang="ru-RU" smtClean="0"/>
               <a:pPr/>
-              <a:t>11.01.2016</a:t>
+              <a:t>13.01.2016</a:t>
             </a:fld>
             <a:endParaRPr lang="ru-RU"/>
           </a:p>
@@ -4778,7 +4831,7 @@
             <a:fld id="{5B106E36-FD25-4E2D-B0AA-010F637433A0}" type="datetimeFigureOut">
               <a:rPr lang="ru-RU" smtClean="0"/>
               <a:pPr/>
-              <a:t>11.01.2016</a:t>
+              <a:t>13.01.2016</a:t>
             </a:fld>
             <a:endParaRPr lang="ru-RU"/>
           </a:p>
@@ -5025,7 +5078,7 @@
             <a:fld id="{5B106E36-FD25-4E2D-B0AA-010F637433A0}" type="datetimeFigureOut">
               <a:rPr lang="ru-RU" smtClean="0"/>
               <a:pPr/>
-              <a:t>11.01.2016</a:t>
+              <a:t>13.01.2016</a:t>
             </a:fld>
             <a:endParaRPr lang="ru-RU"/>
           </a:p>
@@ -5186,7 +5239,7 @@
           </a:lstStyle>
           <a:p>
             <a:r>
-              <a:rPr kumimoji="0" lang="ru-RU" smtClean="0"/>
+              <a:rPr kumimoji="0" lang="ru-RU" dirty="0" smtClean="0"/>
               <a:t>Вставка рисунка</a:t>
             </a:r>
             <a:endParaRPr kumimoji="0" lang="en-US" dirty="0"/>
@@ -5271,7 +5324,7 @@
             <a:fld id="{5B106E36-FD25-4E2D-B0AA-010F637433A0}" type="datetimeFigureOut">
               <a:rPr lang="ru-RU" smtClean="0"/>
               <a:pPr/>
-              <a:t>11.01.2016</a:t>
+              <a:t>13.01.2016</a:t>
             </a:fld>
             <a:endParaRPr lang="ru-RU"/>
           </a:p>
@@ -6097,7 +6150,7 @@
             <a:fld id="{5B106E36-FD25-4E2D-B0AA-010F637433A0}" type="datetimeFigureOut">
               <a:rPr lang="ru-RU" smtClean="0"/>
               <a:pPr/>
-              <a:t>11.01.2016</a:t>
+              <a:t>13.01.2016</a:t>
             </a:fld>
             <a:endParaRPr lang="ru-RU"/>
           </a:p>
@@ -6532,18 +6585,18 @@
           <a:p>
             <a:r>
               <a:rPr lang="ru-RU" dirty="0" smtClean="0"/>
-              <a:t>Автор: Темников А.В., студент группы 521 </a:t>
+              <a:t>Автор</a:t>
+            </a:r>
+            <a:r>
+              <a:rPr lang="ru-RU" dirty="0" smtClean="0"/>
+              <a:t>: Темников А.В., студент группы 521 </a:t>
             </a:r>
             <a:endParaRPr lang="en-US" dirty="0" smtClean="0"/>
           </a:p>
           <a:p>
             <a:r>
               <a:rPr lang="ru-RU" dirty="0" smtClean="0"/>
-              <a:t>Финансового </a:t>
-            </a:r>
-            <a:r>
-              <a:rPr lang="ru-RU" dirty="0" smtClean="0"/>
-              <a:t>Университета при правительстве Российской Федерации</a:t>
+              <a:t>Финансового Университета при правительстве Российской Федерации</a:t>
             </a:r>
             <a:endParaRPr lang="ru-RU" dirty="0"/>
           </a:p>
@@ -6651,11 +6704,15 @@
             </a:r>
             <a:r>
               <a:rPr lang="ru-RU" dirty="0" smtClean="0"/>
-              <a:t>Планирование </a:t>
+              <a:t>Планирование (</a:t>
             </a:r>
             <a:r>
               <a:rPr lang="ru-RU" dirty="0" smtClean="0"/>
-              <a:t>(управление) ресурсами предприятия </a:t>
+              <a:t>управление</a:t>
+            </a:r>
+            <a:r>
+              <a:rPr lang="ru-RU" dirty="0" smtClean="0"/>
+              <a:t>) ресурсами предприятия </a:t>
             </a:r>
             <a:endParaRPr lang="ru-RU" dirty="0" smtClean="0"/>
           </a:p>
@@ -6702,6 +6759,7 @@
               <a:rPr lang="ru-RU" dirty="0" smtClean="0"/>
               <a:t>Управление жизненным циклом</a:t>
             </a:r>
+            <a:endParaRPr lang="ru-RU" dirty="0" smtClean="0"/>
           </a:p>
           <a:p>
             <a:pPr>
@@ -6788,10 +6846,6 @@
               <a:rPr lang="en-US" dirty="0" err="1" smtClean="0"/>
               <a:t>Windchill</a:t>
             </a:r>
-            <a:r>
-              <a:rPr lang="en-US" dirty="0" smtClean="0"/>
-              <a:t> PLM</a:t>
-            </a:r>
             <a:endParaRPr lang="ru-RU" dirty="0"/>
           </a:p>
         </p:txBody>
@@ -6808,10 +6862,250 @@
         </p:nvSpPr>
         <p:spPr/>
         <p:txBody>
-          <a:bodyPr/>
-          <a:lstStyle/>
-          <a:p>
-            <a:endParaRPr lang="ru-RU" dirty="0"/>
+          <a:bodyPr>
+            <a:normAutofit fontScale="70000" lnSpcReduction="20000"/>
+          </a:bodyPr>
+          <a:lstStyle/>
+          <a:p>
+            <a:pPr>
+              <a:buNone/>
+            </a:pPr>
+            <a:r>
+              <a:rPr lang="ru-RU" b="1" dirty="0" smtClean="0">
+                <a:latin typeface="Times New Roman" pitchFamily="18" charset="0"/>
+                <a:cs typeface="Times New Roman" pitchFamily="18" charset="0"/>
+              </a:rPr>
+              <a:t>		PTC </a:t>
+            </a:r>
+            <a:r>
+              <a:rPr lang="ru-RU" b="1" dirty="0" err="1" smtClean="0">
+                <a:latin typeface="Times New Roman" pitchFamily="18" charset="0"/>
+                <a:cs typeface="Times New Roman" pitchFamily="18" charset="0"/>
+              </a:rPr>
+              <a:t>Windchill</a:t>
+            </a:r>
+            <a:r>
+              <a:rPr lang="ru-RU" dirty="0" smtClean="0">
+                <a:latin typeface="Times New Roman" pitchFamily="18" charset="0"/>
+                <a:cs typeface="Times New Roman" pitchFamily="18" charset="0"/>
+              </a:rPr>
+              <a:t> — это PLM-система, предназначенная для автоматизации процессов управления данными.  </a:t>
+            </a:r>
+            <a:r>
+              <a:rPr lang="ru-RU" b="1" dirty="0" smtClean="0">
+                <a:latin typeface="Times New Roman" pitchFamily="18" charset="0"/>
+                <a:cs typeface="Times New Roman" pitchFamily="18" charset="0"/>
+              </a:rPr>
+              <a:t>PTC </a:t>
+            </a:r>
+            <a:r>
+              <a:rPr lang="ru-RU" b="1" dirty="0" err="1" smtClean="0">
+                <a:latin typeface="Times New Roman" pitchFamily="18" charset="0"/>
+                <a:cs typeface="Times New Roman" pitchFamily="18" charset="0"/>
+              </a:rPr>
+              <a:t>Windchill</a:t>
+            </a:r>
+            <a:r>
+              <a:rPr lang="ru-RU" dirty="0" smtClean="0">
+                <a:latin typeface="Times New Roman" pitchFamily="18" charset="0"/>
+                <a:cs typeface="Times New Roman" pitchFamily="18" charset="0"/>
+              </a:rPr>
+              <a:t> позволяет управлять всей информацией о структуре изделия при его разработке – от концепции до утилизации, от изготовления отдельных деталей до сдачи их в эксплуатацию и т.д. </a:t>
+            </a:r>
+          </a:p>
+          <a:p>
+            <a:pPr>
+              <a:buNone/>
+            </a:pPr>
+            <a:r>
+              <a:rPr lang="ru-RU" b="1" dirty="0" smtClean="0">
+                <a:latin typeface="Times New Roman" pitchFamily="18" charset="0"/>
+                <a:cs typeface="Times New Roman" pitchFamily="18" charset="0"/>
+              </a:rPr>
+              <a:t>	</a:t>
+            </a:r>
+            <a:r>
+              <a:rPr lang="ru-RU" b="1" dirty="0" smtClean="0">
+                <a:latin typeface="Times New Roman" pitchFamily="18" charset="0"/>
+                <a:cs typeface="Times New Roman" pitchFamily="18" charset="0"/>
+              </a:rPr>
+              <a:t>	PTC</a:t>
+            </a:r>
+            <a:r>
+              <a:rPr lang="ru-RU" dirty="0" smtClean="0">
+                <a:latin typeface="Times New Roman" pitchFamily="18" charset="0"/>
+                <a:cs typeface="Times New Roman" pitchFamily="18" charset="0"/>
+              </a:rPr>
+              <a:t> </a:t>
+            </a:r>
+            <a:r>
+              <a:rPr lang="ru-RU" b="1" dirty="0" err="1" smtClean="0">
+                <a:latin typeface="Times New Roman" pitchFamily="18" charset="0"/>
+                <a:cs typeface="Times New Roman" pitchFamily="18" charset="0"/>
+              </a:rPr>
+              <a:t>Windchill</a:t>
+            </a:r>
+            <a:r>
+              <a:rPr lang="ru-RU" b="1" dirty="0" smtClean="0">
+                <a:latin typeface="Times New Roman" pitchFamily="18" charset="0"/>
+                <a:cs typeface="Times New Roman" pitchFamily="18" charset="0"/>
+              </a:rPr>
+              <a:t> </a:t>
+            </a:r>
+            <a:r>
+              <a:rPr lang="ru-RU" dirty="0" smtClean="0">
+                <a:latin typeface="Times New Roman" pitchFamily="18" charset="0"/>
+                <a:cs typeface="Times New Roman" pitchFamily="18" charset="0"/>
+              </a:rPr>
+              <a:t>предоставляет необходимую функциональность для автоматизации процессов управления данными изделия при одновременной разработке различными группами разработчиков. Архитектура системы </a:t>
+            </a:r>
+            <a:r>
+              <a:rPr lang="ru-RU" b="1" dirty="0" smtClean="0">
+                <a:latin typeface="Times New Roman" pitchFamily="18" charset="0"/>
+                <a:cs typeface="Times New Roman" pitchFamily="18" charset="0"/>
+              </a:rPr>
+              <a:t>PTC</a:t>
+            </a:r>
+            <a:r>
+              <a:rPr lang="ru-RU" dirty="0" smtClean="0">
+                <a:latin typeface="Times New Roman" pitchFamily="18" charset="0"/>
+                <a:cs typeface="Times New Roman" pitchFamily="18" charset="0"/>
+              </a:rPr>
+              <a:t> </a:t>
+            </a:r>
+            <a:r>
+              <a:rPr lang="ru-RU" b="1" dirty="0" err="1" smtClean="0">
+                <a:latin typeface="Times New Roman" pitchFamily="18" charset="0"/>
+                <a:cs typeface="Times New Roman" pitchFamily="18" charset="0"/>
+              </a:rPr>
+              <a:t>Windchill</a:t>
+            </a:r>
+            <a:r>
+              <a:rPr lang="ru-RU" dirty="0" smtClean="0">
+                <a:latin typeface="Times New Roman" pitchFamily="18" charset="0"/>
+                <a:cs typeface="Times New Roman" pitchFamily="18" charset="0"/>
+              </a:rPr>
+              <a:t> построена на основе web-технологий, что позволяет не только динамично развивать систему, но и использовать стандартные web-инструменты – такой подход существенно упрощает администрирование системы и работу ее пользователей</a:t>
+            </a:r>
+            <a:r>
+              <a:rPr lang="ru-RU" dirty="0" smtClean="0">
+                <a:latin typeface="Times New Roman" pitchFamily="18" charset="0"/>
+                <a:cs typeface="Times New Roman" pitchFamily="18" charset="0"/>
+              </a:rPr>
+              <a:t>.</a:t>
+            </a:r>
+            <a:endParaRPr lang="ru-RU" dirty="0">
+              <a:latin typeface="Times New Roman" pitchFamily="18" charset="0"/>
+              <a:cs typeface="Times New Roman" pitchFamily="18" charset="0"/>
+            </a:endParaRPr>
+          </a:p>
+        </p:txBody>
+      </p:sp>
+      <p:pic>
+        <p:nvPicPr>
+          <p:cNvPr id="6" name="Содержимое 5" descr="windchill-.png"/>
+          <p:cNvPicPr>
+            <a:picLocks noGrp="1" noChangeAspect="1"/>
+          </p:cNvPicPr>
+          <p:nvPr>
+            <p:ph sz="half" idx="2"/>
+          </p:nvPr>
+        </p:nvPicPr>
+        <p:blipFill>
+          <a:blip r:embed="rId2"/>
+          <a:stretch>
+            <a:fillRect/>
+          </a:stretch>
+        </p:blipFill>
+        <p:spPr>
+          <a:xfrm>
+            <a:off x="5105400" y="1285860"/>
+            <a:ext cx="4038600" cy="2898673"/>
+          </a:xfrm>
+        </p:spPr>
+      </p:pic>
+      <p:pic>
+        <p:nvPicPr>
+          <p:cNvPr id="7" name="Рисунок 6" descr="Windchill-10-PSB-image.png"/>
+          <p:cNvPicPr>
+            <a:picLocks noChangeAspect="1"/>
+          </p:cNvPicPr>
+          <p:nvPr/>
+        </p:nvPicPr>
+        <p:blipFill>
+          <a:blip r:embed="rId3"/>
+          <a:stretch>
+            <a:fillRect/>
+          </a:stretch>
+        </p:blipFill>
+        <p:spPr>
+          <a:xfrm>
+            <a:off x="4643437" y="3571876"/>
+            <a:ext cx="4296781" cy="3000396"/>
+          </a:xfrm>
+          <a:prstGeom prst="rect">
+            <a:avLst/>
+          </a:prstGeom>
+        </p:spPr>
+      </p:pic>
+    </p:spTree>
+  </p:cSld>
+  <p:clrMapOvr>
+    <a:masterClrMapping/>
+  </p:clrMapOvr>
+</p:sld>
+</file>
+
+<file path=ppt/slides/slide4.xml><?xml version="1.0" encoding="utf-8"?>
+<p:sld xmlns:a="http://schemas.openxmlformats.org/drawingml/2006/main" xmlns:r="http://schemas.openxmlformats.org/officeDocument/2006/relationships" xmlns:p="http://schemas.openxmlformats.org/presentationml/2006/main">
+  <p:cSld>
+    <p:spTree>
+      <p:nvGrpSpPr>
+        <p:cNvPr id="1" name=""/>
+        <p:cNvGrpSpPr/>
+        <p:nvPr/>
+      </p:nvGrpSpPr>
+      <p:grpSpPr>
+        <a:xfrm>
+          <a:off x="0" y="0"/>
+          <a:ext cx="0" cy="0"/>
+          <a:chOff x="0" y="0"/>
+          <a:chExt cx="0" cy="0"/>
+        </a:xfrm>
+      </p:grpSpPr>
+      <p:sp>
+        <p:nvSpPr>
+          <p:cNvPr id="2" name="Заголовок 1"/>
+          <p:cNvSpPr>
+            <a:spLocks noGrp="1"/>
+          </p:cNvSpPr>
+          <p:nvPr>
+            <p:ph type="title"/>
+          </p:nvPr>
+        </p:nvSpPr>
+        <p:spPr/>
+        <p:txBody>
+          <a:bodyPr>
+            <a:normAutofit fontScale="90000"/>
+          </a:bodyPr>
+          <a:lstStyle/>
+          <a:p>
+            <a:r>
+              <a:rPr lang="ru-RU" dirty="0" smtClean="0"/>
+              <a:t>Классификации </a:t>
+            </a:r>
+            <a:r>
+              <a:rPr lang="ru-RU" dirty="0" smtClean="0"/>
+              <a:t>СППР</a:t>
+            </a:r>
+            <a:br>
+              <a:rPr lang="ru-RU" dirty="0" smtClean="0"/>
+            </a:br>
+            <a:r>
+              <a:rPr lang="ru-RU" sz="3100" dirty="0" smtClean="0"/>
+              <a:t>Взаимодействие с пользователем:</a:t>
+            </a:r>
+            <a:endParaRPr lang="ru-RU" sz="3100" dirty="0"/>
           </a:p>
         </p:txBody>
       </p:sp>
@@ -6822,7 +7116,385 @@
             <a:spLocks noGrp="1"/>
           </p:cNvSpPr>
           <p:nvPr>
-            <p:ph sz="half" idx="2"/>
+            <p:ph idx="1"/>
+          </p:nvPr>
+        </p:nvSpPr>
+        <p:spPr/>
+        <p:txBody>
+          <a:bodyPr>
+            <a:normAutofit/>
+          </a:bodyPr>
+          <a:lstStyle/>
+          <a:p>
+            <a:pPr lvl="0"/>
+            <a:r>
+              <a:rPr lang="ru-RU" b="1" dirty="0" smtClean="0"/>
+              <a:t>Пассивные</a:t>
+            </a:r>
+            <a:r>
+              <a:rPr lang="ru-RU" dirty="0" smtClean="0"/>
+              <a:t> </a:t>
+            </a:r>
+            <a:r>
+              <a:rPr lang="ru-RU" dirty="0" smtClean="0"/>
+              <a:t>помогают в процессе принятия решений, но не могут выдвинуть конкретного предложения;</a:t>
+            </a:r>
+          </a:p>
+          <a:p>
+            <a:pPr lvl="0"/>
+            <a:r>
+              <a:rPr lang="ru-RU" b="1" dirty="0" smtClean="0"/>
+              <a:t>Активные</a:t>
+            </a:r>
+            <a:r>
+              <a:rPr lang="ru-RU" dirty="0" smtClean="0"/>
+              <a:t> </a:t>
+            </a:r>
+            <a:r>
+              <a:rPr lang="ru-RU" dirty="0" smtClean="0"/>
+              <a:t>непосредственно участвуют в разработке правильного решения;</a:t>
+            </a:r>
+          </a:p>
+          <a:p>
+            <a:pPr lvl="0"/>
+            <a:r>
+              <a:rPr lang="ru-RU" b="1" dirty="0" smtClean="0"/>
+              <a:t>Кооперативные</a:t>
+            </a:r>
+            <a:r>
+              <a:rPr lang="ru-RU" dirty="0" smtClean="0"/>
+              <a:t> предполагают взаимодействие СППР с пользователем. </a:t>
+            </a:r>
+            <a:endParaRPr lang="ru-RU" dirty="0" smtClean="0"/>
+          </a:p>
+        </p:txBody>
+      </p:sp>
+    </p:spTree>
+  </p:cSld>
+  <p:clrMapOvr>
+    <a:masterClrMapping/>
+  </p:clrMapOvr>
+</p:sld>
+</file>
+
+<file path=ppt/slides/slide5.xml><?xml version="1.0" encoding="utf-8"?>
+<p:sld xmlns:a="http://schemas.openxmlformats.org/drawingml/2006/main" xmlns:r="http://schemas.openxmlformats.org/officeDocument/2006/relationships" xmlns:p="http://schemas.openxmlformats.org/presentationml/2006/main">
+  <p:cSld>
+    <p:spTree>
+      <p:nvGrpSpPr>
+        <p:cNvPr id="1" name=""/>
+        <p:cNvGrpSpPr/>
+        <p:nvPr/>
+      </p:nvGrpSpPr>
+      <p:grpSpPr>
+        <a:xfrm>
+          <a:off x="0" y="0"/>
+          <a:ext cx="0" cy="0"/>
+          <a:chOff x="0" y="0"/>
+          <a:chExt cx="0" cy="0"/>
+        </a:xfrm>
+      </p:grpSpPr>
+      <p:sp>
+        <p:nvSpPr>
+          <p:cNvPr id="2" name="Заголовок 1"/>
+          <p:cNvSpPr>
+            <a:spLocks noGrp="1"/>
+          </p:cNvSpPr>
+          <p:nvPr>
+            <p:ph type="title"/>
+          </p:nvPr>
+        </p:nvSpPr>
+        <p:spPr/>
+        <p:txBody>
+          <a:bodyPr>
+            <a:normAutofit fontScale="90000"/>
+          </a:bodyPr>
+          <a:lstStyle/>
+          <a:p>
+            <a:r>
+              <a:rPr lang="ru-RU" dirty="0" smtClean="0"/>
+              <a:t>Классификации СППР</a:t>
+            </a:r>
+            <a:br>
+              <a:rPr lang="ru-RU" dirty="0" smtClean="0"/>
+            </a:br>
+            <a:r>
+              <a:rPr lang="ru-RU" sz="3100" dirty="0" smtClean="0"/>
+              <a:t>По способу поддержки различают</a:t>
+            </a:r>
+            <a:r>
+              <a:rPr lang="ru-RU" sz="3100" dirty="0" smtClean="0"/>
+              <a:t>:</a:t>
+            </a:r>
+            <a:endParaRPr lang="ru-RU" sz="3100" dirty="0"/>
+          </a:p>
+        </p:txBody>
+      </p:sp>
+      <p:sp>
+        <p:nvSpPr>
+          <p:cNvPr id="3" name="Содержимое 2"/>
+          <p:cNvSpPr>
+            <a:spLocks noGrp="1"/>
+          </p:cNvSpPr>
+          <p:nvPr>
+            <p:ph idx="1"/>
+          </p:nvPr>
+        </p:nvSpPr>
+        <p:spPr/>
+        <p:txBody>
+          <a:bodyPr>
+            <a:normAutofit fontScale="77500" lnSpcReduction="20000"/>
+          </a:bodyPr>
+          <a:lstStyle/>
+          <a:p>
+            <a:pPr lvl="0"/>
+            <a:r>
+              <a:rPr lang="ru-RU" b="1" dirty="0" smtClean="0"/>
+              <a:t>Модельно-ориентированные </a:t>
+            </a:r>
+            <a:r>
+              <a:rPr lang="ru-RU" b="1" dirty="0" smtClean="0"/>
+              <a:t>СППР</a:t>
+            </a:r>
+            <a:r>
+              <a:rPr lang="ru-RU" dirty="0" smtClean="0"/>
+              <a:t>, используют в работе доступ к статистическим, финансовым или иным моделям;</a:t>
+            </a:r>
+          </a:p>
+          <a:p>
+            <a:pPr lvl="0"/>
+            <a:r>
+              <a:rPr lang="ru-RU" b="1" dirty="0" smtClean="0"/>
+              <a:t>СППР, основанные на коммуникациях</a:t>
+            </a:r>
+            <a:r>
+              <a:rPr lang="ru-RU" dirty="0" smtClean="0"/>
+              <a:t>, поддерживают работу двух и более пользователей, занимающихся общей задачей;</a:t>
+            </a:r>
+          </a:p>
+          <a:p>
+            <a:pPr lvl="0"/>
+            <a:r>
+              <a:rPr lang="ru-RU" b="1" dirty="0" smtClean="0"/>
+              <a:t>СППР, ориентированные на данные</a:t>
+            </a:r>
+            <a:r>
+              <a:rPr lang="ru-RU" dirty="0" smtClean="0"/>
+              <a:t>, имеют доступ к временным рядам организации. Они используют в работе не только внутренние, но и внешние данные;</a:t>
+            </a:r>
+          </a:p>
+          <a:p>
+            <a:pPr lvl="0"/>
+            <a:r>
+              <a:rPr lang="ru-RU" b="1" dirty="0" smtClean="0"/>
+              <a:t>СППР, ориентированные на документы</a:t>
+            </a:r>
+            <a:r>
+              <a:rPr lang="ru-RU" dirty="0" smtClean="0"/>
+              <a:t>, манипулируют неструктурированной информацией, заключенной в различных электронных форматах;</a:t>
+            </a:r>
+          </a:p>
+          <a:p>
+            <a:pPr lvl="0"/>
+            <a:r>
+              <a:rPr lang="ru-RU" b="1" dirty="0" smtClean="0"/>
+              <a:t>СППР, ориентированные на знания</a:t>
+            </a:r>
+            <a:r>
+              <a:rPr lang="ru-RU" dirty="0" smtClean="0"/>
+              <a:t>, предоставляют специализированные решения проблем, основанные на фактах.</a:t>
+            </a:r>
+          </a:p>
+          <a:p>
+            <a:endParaRPr lang="ru-RU" dirty="0"/>
+          </a:p>
+        </p:txBody>
+      </p:sp>
+    </p:spTree>
+  </p:cSld>
+  <p:clrMapOvr>
+    <a:masterClrMapping/>
+  </p:clrMapOvr>
+</p:sld>
+</file>
+
+<file path=ppt/slides/slide6.xml><?xml version="1.0" encoding="utf-8"?>
+<p:sld xmlns:a="http://schemas.openxmlformats.org/drawingml/2006/main" xmlns:r="http://schemas.openxmlformats.org/officeDocument/2006/relationships" xmlns:p="http://schemas.openxmlformats.org/presentationml/2006/main">
+  <p:cSld>
+    <p:spTree>
+      <p:nvGrpSpPr>
+        <p:cNvPr id="1" name=""/>
+        <p:cNvGrpSpPr/>
+        <p:nvPr/>
+      </p:nvGrpSpPr>
+      <p:grpSpPr>
+        <a:xfrm>
+          <a:off x="0" y="0"/>
+          <a:ext cx="0" cy="0"/>
+          <a:chOff x="0" y="0"/>
+          <a:chExt cx="0" cy="0"/>
+        </a:xfrm>
+      </p:grpSpPr>
+      <p:sp>
+        <p:nvSpPr>
+          <p:cNvPr id="2" name="Заголовок 1"/>
+          <p:cNvSpPr>
+            <a:spLocks noGrp="1"/>
+          </p:cNvSpPr>
+          <p:nvPr>
+            <p:ph type="title"/>
+          </p:nvPr>
+        </p:nvSpPr>
+        <p:spPr/>
+        <p:txBody>
+          <a:bodyPr>
+            <a:normAutofit fontScale="90000"/>
+          </a:bodyPr>
+          <a:lstStyle/>
+          <a:p>
+            <a:r>
+              <a:rPr lang="ru-RU" dirty="0" smtClean="0"/>
+              <a:t/>
+            </a:r>
+            <a:br>
+              <a:rPr lang="ru-RU" dirty="0" smtClean="0"/>
+            </a:br>
+            <a:r>
+              <a:rPr lang="ru-RU" dirty="0" smtClean="0"/>
+              <a:t>Классификации </a:t>
+            </a:r>
+            <a:r>
+              <a:rPr lang="ru-RU" dirty="0" smtClean="0"/>
+              <a:t>СППР </a:t>
+            </a:r>
+            <a:r>
+              <a:rPr lang="ru-RU" dirty="0" smtClean="0"/>
+              <a:t/>
+            </a:r>
+            <a:br>
+              <a:rPr lang="ru-RU" dirty="0" smtClean="0"/>
+            </a:br>
+            <a:r>
+              <a:rPr lang="ru-RU" sz="3100" dirty="0" smtClean="0"/>
+              <a:t>По </a:t>
+            </a:r>
+            <a:r>
+              <a:rPr lang="ru-RU" sz="3100" dirty="0" smtClean="0"/>
+              <a:t>сфере использования выделяют:</a:t>
+            </a:r>
+            <a:r>
+              <a:rPr lang="ru-RU" dirty="0" smtClean="0"/>
+              <a:t/>
+            </a:r>
+            <a:br>
+              <a:rPr lang="ru-RU" dirty="0" smtClean="0"/>
+            </a:br>
+            <a:endParaRPr lang="ru-RU" dirty="0"/>
+          </a:p>
+        </p:txBody>
+      </p:sp>
+      <p:sp>
+        <p:nvSpPr>
+          <p:cNvPr id="3" name="Содержимое 2"/>
+          <p:cNvSpPr>
+            <a:spLocks noGrp="1"/>
+          </p:cNvSpPr>
+          <p:nvPr>
+            <p:ph idx="1"/>
+          </p:nvPr>
+        </p:nvSpPr>
+        <p:spPr/>
+        <p:txBody>
+          <a:bodyPr/>
+          <a:lstStyle/>
+          <a:p>
+            <a:r>
+              <a:rPr lang="ru-RU" b="1" dirty="0" smtClean="0"/>
+              <a:t>Общесистемные </a:t>
+            </a:r>
+            <a:r>
+              <a:rPr lang="ru-RU" dirty="0" smtClean="0"/>
+              <a:t>работают с </a:t>
+            </a:r>
+            <a:r>
+              <a:rPr lang="ru-RU" dirty="0" smtClean="0"/>
+              <a:t>большими системами хранения данных и применяются многими пользователями. </a:t>
+            </a:r>
+            <a:endParaRPr lang="ru-RU" b="1" dirty="0" smtClean="0"/>
+          </a:p>
+          <a:p>
+            <a:pPr lvl="0"/>
+            <a:r>
+              <a:rPr lang="ru-RU" b="1" dirty="0" smtClean="0"/>
+              <a:t>Настольные СППР </a:t>
+            </a:r>
+            <a:r>
+              <a:rPr lang="ru-RU" dirty="0" smtClean="0"/>
+              <a:t>являются </a:t>
+            </a:r>
+            <a:r>
+              <a:rPr lang="ru-RU" dirty="0" smtClean="0"/>
+              <a:t>небольшими системами и подходят для управления с персонального компьютера одного пользователя.</a:t>
+            </a:r>
+            <a:endParaRPr lang="ru-RU" b="1" dirty="0" smtClean="0"/>
+          </a:p>
+          <a:p>
+            <a:endParaRPr lang="ru-RU" dirty="0"/>
+          </a:p>
+        </p:txBody>
+      </p:sp>
+    </p:spTree>
+  </p:cSld>
+  <p:clrMapOvr>
+    <a:masterClrMapping/>
+  </p:clrMapOvr>
+</p:sld>
+</file>
+
+<file path=ppt/slides/slide7.xml><?xml version="1.0" encoding="utf-8"?>
+<p:sld xmlns:a="http://schemas.openxmlformats.org/drawingml/2006/main" xmlns:r="http://schemas.openxmlformats.org/officeDocument/2006/relationships" xmlns:p="http://schemas.openxmlformats.org/presentationml/2006/main">
+  <p:cSld>
+    <p:spTree>
+      <p:nvGrpSpPr>
+        <p:cNvPr id="1" name=""/>
+        <p:cNvGrpSpPr/>
+        <p:nvPr/>
+      </p:nvGrpSpPr>
+      <p:grpSpPr>
+        <a:xfrm>
+          <a:off x="0" y="0"/>
+          <a:ext cx="0" cy="0"/>
+          <a:chOff x="0" y="0"/>
+          <a:chExt cx="0" cy="0"/>
+        </a:xfrm>
+      </p:grpSpPr>
+      <p:sp>
+        <p:nvSpPr>
+          <p:cNvPr id="2" name="Заголовок 1"/>
+          <p:cNvSpPr>
+            <a:spLocks noGrp="1"/>
+          </p:cNvSpPr>
+          <p:nvPr>
+            <p:ph type="title"/>
+          </p:nvPr>
+        </p:nvSpPr>
+        <p:spPr/>
+        <p:txBody>
+          <a:bodyPr/>
+          <a:lstStyle/>
+          <a:p>
+            <a:endParaRPr lang="ru-RU"/>
+          </a:p>
+        </p:txBody>
+      </p:sp>
+      <p:sp>
+        <p:nvSpPr>
+          <p:cNvPr id="3" name="Содержимое 2"/>
+          <p:cNvSpPr>
+            <a:spLocks noGrp="1"/>
+          </p:cNvSpPr>
+          <p:nvPr>
+            <p:ph idx="1"/>
           </p:nvPr>
         </p:nvSpPr>
         <p:spPr/>

</xml_diff>

<commit_message>
Finished presentation for PPR
</commit_message>
<xml_diff>
--- a/5kurs/graf/Tem521PPRpresent.pptx
+++ b/5kurs/graf/Tem521PPRpresent.pptx
@@ -12,6 +12,19 @@
     <p:sldId id="260" r:id="rId6"/>
     <p:sldId id="261" r:id="rId7"/>
     <p:sldId id="262" r:id="rId8"/>
+    <p:sldId id="263" r:id="rId9"/>
+    <p:sldId id="264" r:id="rId10"/>
+    <p:sldId id="265" r:id="rId11"/>
+    <p:sldId id="266" r:id="rId12"/>
+    <p:sldId id="267" r:id="rId13"/>
+    <p:sldId id="268" r:id="rId14"/>
+    <p:sldId id="269" r:id="rId15"/>
+    <p:sldId id="270" r:id="rId16"/>
+    <p:sldId id="271" r:id="rId17"/>
+    <p:sldId id="272" r:id="rId18"/>
+    <p:sldId id="273" r:id="rId19"/>
+    <p:sldId id="274" r:id="rId20"/>
+    <p:sldId id="275" r:id="rId21"/>
   </p:sldIdLst>
   <p:sldSz cx="9144000" cy="6858000" type="screen4x3"/>
   <p:notesSz cx="6858000" cy="9144000"/>
@@ -6610,6 +6623,1305 @@
 </p:sld>
 </file>
 
+<file path=ppt/slides/slide10.xml><?xml version="1.0" encoding="utf-8"?>
+<p:sld xmlns:a="http://schemas.openxmlformats.org/drawingml/2006/main" xmlns:r="http://schemas.openxmlformats.org/officeDocument/2006/relationships" xmlns:p="http://schemas.openxmlformats.org/presentationml/2006/main">
+  <p:cSld>
+    <p:spTree>
+      <p:nvGrpSpPr>
+        <p:cNvPr id="1" name=""/>
+        <p:cNvGrpSpPr/>
+        <p:nvPr/>
+      </p:nvGrpSpPr>
+      <p:grpSpPr>
+        <a:xfrm>
+          <a:off x="0" y="0"/>
+          <a:ext cx="0" cy="0"/>
+          <a:chOff x="0" y="0"/>
+          <a:chExt cx="0" cy="0"/>
+        </a:xfrm>
+      </p:grpSpPr>
+      <p:sp>
+        <p:nvSpPr>
+          <p:cNvPr id="5" name="Заголовок 4"/>
+          <p:cNvSpPr>
+            <a:spLocks noGrp="1"/>
+          </p:cNvSpPr>
+          <p:nvPr>
+            <p:ph type="title"/>
+          </p:nvPr>
+        </p:nvSpPr>
+        <p:spPr/>
+        <p:txBody>
+          <a:bodyPr/>
+          <a:lstStyle/>
+          <a:p>
+            <a:r>
+              <a:rPr lang="ru-RU" dirty="0" smtClean="0"/>
+              <a:t>Жизненный цикл продукции:</a:t>
+            </a:r>
+            <a:endParaRPr lang="ru-RU" dirty="0"/>
+          </a:p>
+        </p:txBody>
+      </p:sp>
+      <p:sp>
+        <p:nvSpPr>
+          <p:cNvPr id="6" name="Содержимое 5"/>
+          <p:cNvSpPr>
+            <a:spLocks noGrp="1"/>
+          </p:cNvSpPr>
+          <p:nvPr>
+            <p:ph idx="1"/>
+          </p:nvPr>
+        </p:nvSpPr>
+        <p:spPr/>
+        <p:txBody>
+          <a:bodyPr/>
+          <a:lstStyle/>
+          <a:p>
+            <a:pPr marL="624078" lvl="0" indent="-514350">
+              <a:buFont typeface="+mj-lt"/>
+              <a:buAutoNum type="arabicPeriod"/>
+            </a:pPr>
+            <a:r>
+              <a:rPr lang="ru-RU" dirty="0" smtClean="0"/>
+              <a:t>Маркетинговые исследования</a:t>
+            </a:r>
+          </a:p>
+          <a:p>
+            <a:pPr marL="624078" lvl="0" indent="-514350">
+              <a:buFont typeface="+mj-lt"/>
+              <a:buAutoNum type="arabicPeriod"/>
+            </a:pPr>
+            <a:r>
+              <a:rPr lang="ru-RU" dirty="0" smtClean="0"/>
+              <a:t>Проектирование</a:t>
+            </a:r>
+          </a:p>
+          <a:p>
+            <a:pPr marL="624078" lvl="0" indent="-514350">
+              <a:buFont typeface="+mj-lt"/>
+              <a:buAutoNum type="arabicPeriod"/>
+            </a:pPr>
+            <a:r>
+              <a:rPr lang="ru-RU" dirty="0" smtClean="0"/>
+              <a:t>Технологическая подготовка производства (ТПП)</a:t>
+            </a:r>
+          </a:p>
+          <a:p>
+            <a:pPr marL="624078" lvl="0" indent="-514350">
+              <a:buFont typeface="+mj-lt"/>
+              <a:buAutoNum type="arabicPeriod"/>
+            </a:pPr>
+            <a:r>
+              <a:rPr lang="ru-RU" dirty="0" smtClean="0"/>
+              <a:t>Собственно производство</a:t>
+            </a:r>
+          </a:p>
+          <a:p>
+            <a:pPr marL="624078" lvl="0" indent="-514350">
+              <a:buFont typeface="+mj-lt"/>
+              <a:buAutoNum type="arabicPeriod"/>
+            </a:pPr>
+            <a:r>
+              <a:rPr lang="ru-RU" dirty="0" smtClean="0"/>
+              <a:t>Послепродажное обслуживание</a:t>
+            </a:r>
+          </a:p>
+          <a:p>
+            <a:pPr marL="624078" lvl="0" indent="-514350">
+              <a:buFont typeface="+mj-lt"/>
+              <a:buAutoNum type="arabicPeriod"/>
+            </a:pPr>
+            <a:r>
+              <a:rPr lang="ru-RU" dirty="0" smtClean="0"/>
+              <a:t>Эксплуатация продукции</a:t>
+            </a:r>
+          </a:p>
+          <a:p>
+            <a:pPr marL="624078" lvl="0" indent="-514350">
+              <a:buFont typeface="+mj-lt"/>
+              <a:buAutoNum type="arabicPeriod"/>
+            </a:pPr>
+            <a:r>
+              <a:rPr lang="ru-RU" dirty="0" smtClean="0"/>
+              <a:t>Утилизация</a:t>
+            </a:r>
+          </a:p>
+          <a:p>
+            <a:endParaRPr lang="ru-RU" dirty="0"/>
+          </a:p>
+        </p:txBody>
+      </p:sp>
+    </p:spTree>
+  </p:cSld>
+  <p:clrMapOvr>
+    <a:masterClrMapping/>
+  </p:clrMapOvr>
+</p:sld>
+</file>
+
+<file path=ppt/slides/slide11.xml><?xml version="1.0" encoding="utf-8"?>
+<p:sld xmlns:a="http://schemas.openxmlformats.org/drawingml/2006/main" xmlns:r="http://schemas.openxmlformats.org/officeDocument/2006/relationships" xmlns:p="http://schemas.openxmlformats.org/presentationml/2006/main">
+  <p:cSld>
+    <p:spTree>
+      <p:nvGrpSpPr>
+        <p:cNvPr id="1" name=""/>
+        <p:cNvGrpSpPr/>
+        <p:nvPr/>
+      </p:nvGrpSpPr>
+      <p:grpSpPr>
+        <a:xfrm>
+          <a:off x="0" y="0"/>
+          <a:ext cx="0" cy="0"/>
+          <a:chOff x="0" y="0"/>
+          <a:chExt cx="0" cy="0"/>
+        </a:xfrm>
+      </p:grpSpPr>
+      <p:sp>
+        <p:nvSpPr>
+          <p:cNvPr id="2" name="Заголовок 1"/>
+          <p:cNvSpPr>
+            <a:spLocks noGrp="1"/>
+          </p:cNvSpPr>
+          <p:nvPr>
+            <p:ph type="title"/>
+          </p:nvPr>
+        </p:nvSpPr>
+        <p:spPr/>
+        <p:txBody>
+          <a:bodyPr>
+            <a:normAutofit fontScale="90000"/>
+          </a:bodyPr>
+          <a:lstStyle/>
+          <a:p>
+            <a:r>
+              <a:rPr lang="ru-RU" dirty="0" smtClean="0"/>
+              <a:t>Данные для поддержки принятия решений</a:t>
+            </a:r>
+            <a:endParaRPr lang="ru-RU" dirty="0"/>
+          </a:p>
+        </p:txBody>
+      </p:sp>
+      <p:sp>
+        <p:nvSpPr>
+          <p:cNvPr id="3" name="Содержимое 2"/>
+          <p:cNvSpPr>
+            <a:spLocks noGrp="1"/>
+          </p:cNvSpPr>
+          <p:nvPr>
+            <p:ph idx="1"/>
+          </p:nvPr>
+        </p:nvSpPr>
+        <p:spPr/>
+        <p:txBody>
+          <a:bodyPr>
+            <a:normAutofit fontScale="92500" lnSpcReduction="10000"/>
+          </a:bodyPr>
+          <a:lstStyle/>
+          <a:p>
+            <a:pPr lvl="0"/>
+            <a:r>
+              <a:rPr lang="ru-RU" dirty="0" smtClean="0"/>
+              <a:t>Количество и параметры покупных комплектующих изделий;</a:t>
+            </a:r>
+          </a:p>
+          <a:p>
+            <a:pPr lvl="0"/>
+            <a:r>
+              <a:rPr lang="ru-RU" dirty="0" smtClean="0"/>
+              <a:t>Электрические характеристики радиодеталей; </a:t>
+            </a:r>
+          </a:p>
+          <a:p>
+            <a:pPr lvl="0"/>
+            <a:r>
+              <a:rPr lang="ru-RU" dirty="0" smtClean="0"/>
+              <a:t>Допустимые замены стандартных (покупных) изделий;</a:t>
+            </a:r>
+          </a:p>
+          <a:p>
+            <a:pPr lvl="0"/>
+            <a:r>
+              <a:rPr lang="ru-RU" dirty="0" smtClean="0"/>
+              <a:t>Используемые материалы и габариты деталей;</a:t>
+            </a:r>
+          </a:p>
+          <a:p>
+            <a:pPr lvl="0"/>
+            <a:r>
+              <a:rPr lang="ru-RU" dirty="0" smtClean="0"/>
+              <a:t>Технологический маршрут изделия;</a:t>
+            </a:r>
+          </a:p>
+          <a:p>
+            <a:pPr lvl="0"/>
+            <a:r>
+              <a:rPr lang="ru-RU" dirty="0" smtClean="0"/>
+              <a:t>Состав изделия;</a:t>
+            </a:r>
+          </a:p>
+          <a:p>
+            <a:pPr lvl="0"/>
+            <a:r>
+              <a:rPr lang="ru-RU" dirty="0" smtClean="0"/>
+              <a:t>Трудоёмкость изделий и требуемый разряд рабочих;</a:t>
+            </a:r>
+          </a:p>
+          <a:p>
+            <a:pPr lvl="0"/>
+            <a:r>
+              <a:rPr lang="ru-RU" dirty="0" smtClean="0"/>
+              <a:t>История изменений изделия и др.</a:t>
+            </a:r>
+          </a:p>
+          <a:p>
+            <a:endParaRPr lang="ru-RU" dirty="0"/>
+          </a:p>
+        </p:txBody>
+      </p:sp>
+    </p:spTree>
+  </p:cSld>
+  <p:clrMapOvr>
+    <a:masterClrMapping/>
+  </p:clrMapOvr>
+</p:sld>
+</file>
+
+<file path=ppt/slides/slide12.xml><?xml version="1.0" encoding="utf-8"?>
+<p:sld xmlns:a="http://schemas.openxmlformats.org/drawingml/2006/main" xmlns:r="http://schemas.openxmlformats.org/officeDocument/2006/relationships" xmlns:p="http://schemas.openxmlformats.org/presentationml/2006/main">
+  <p:cSld>
+    <p:spTree>
+      <p:nvGrpSpPr>
+        <p:cNvPr id="1" name=""/>
+        <p:cNvGrpSpPr/>
+        <p:nvPr/>
+      </p:nvGrpSpPr>
+      <p:grpSpPr>
+        <a:xfrm>
+          <a:off x="0" y="0"/>
+          <a:ext cx="0" cy="0"/>
+          <a:chOff x="0" y="0"/>
+          <a:chExt cx="0" cy="0"/>
+        </a:xfrm>
+      </p:grpSpPr>
+      <p:sp>
+        <p:nvSpPr>
+          <p:cNvPr id="2" name="Заголовок 1"/>
+          <p:cNvSpPr>
+            <a:spLocks noGrp="1"/>
+          </p:cNvSpPr>
+          <p:nvPr>
+            <p:ph type="title"/>
+          </p:nvPr>
+        </p:nvSpPr>
+        <p:spPr/>
+        <p:txBody>
+          <a:bodyPr>
+            <a:noAutofit/>
+          </a:bodyPr>
+          <a:lstStyle/>
+          <a:p>
+            <a:pPr lvl="0"/>
+            <a:r>
+              <a:rPr lang="ru-RU" sz="2800" dirty="0" smtClean="0"/>
+              <a:t>Количество и параметры покупных комплектующих </a:t>
+            </a:r>
+            <a:r>
+              <a:rPr lang="ru-RU" sz="2800" dirty="0" smtClean="0"/>
+              <a:t>изделий, электрические характеристики, допустимые замены</a:t>
+            </a:r>
+            <a:endParaRPr lang="ru-RU" sz="2800" dirty="0"/>
+          </a:p>
+        </p:txBody>
+      </p:sp>
+      <p:sp>
+        <p:nvSpPr>
+          <p:cNvPr id="3" name="Содержимое 2"/>
+          <p:cNvSpPr>
+            <a:spLocks noGrp="1"/>
+          </p:cNvSpPr>
+          <p:nvPr>
+            <p:ph idx="1"/>
+          </p:nvPr>
+        </p:nvSpPr>
+        <p:spPr>
+          <a:xfrm>
+            <a:off x="428596" y="2357430"/>
+            <a:ext cx="8229600" cy="4325112"/>
+          </a:xfrm>
+        </p:spPr>
+        <p:txBody>
+          <a:bodyPr/>
+          <a:lstStyle/>
+          <a:p>
+            <a:pPr>
+              <a:buNone/>
+            </a:pPr>
+            <a:r>
+              <a:rPr lang="ru-RU" dirty="0" smtClean="0"/>
+              <a:t>		Возможности </a:t>
+            </a:r>
+            <a:r>
+              <a:rPr lang="ru-RU" dirty="0" smtClean="0"/>
+              <a:t>для поддержки принятия </a:t>
+            </a:r>
+            <a:r>
+              <a:rPr lang="ru-RU" dirty="0" smtClean="0"/>
+              <a:t>решений:</a:t>
+            </a:r>
+            <a:endParaRPr lang="ru-RU" dirty="0" smtClean="0"/>
+          </a:p>
+          <a:p>
+            <a:r>
+              <a:rPr lang="ru-RU" dirty="0" smtClean="0"/>
+              <a:t>Быстрый </a:t>
+            </a:r>
+            <a:r>
+              <a:rPr lang="ru-RU" dirty="0" smtClean="0"/>
+              <a:t>поиск радиоэлементов по параметрам;</a:t>
+            </a:r>
+          </a:p>
+          <a:p>
+            <a:r>
+              <a:rPr lang="ru-RU" dirty="0" smtClean="0"/>
+              <a:t>Расчет </a:t>
+            </a:r>
+            <a:r>
+              <a:rPr lang="ru-RU" dirty="0" smtClean="0"/>
+              <a:t>электрических параметров и массогабаритных характеристик;</a:t>
+            </a:r>
+          </a:p>
+          <a:p>
+            <a:r>
+              <a:rPr lang="ru-RU" dirty="0" smtClean="0"/>
+              <a:t>Информация </a:t>
+            </a:r>
+            <a:r>
+              <a:rPr lang="ru-RU" dirty="0" smtClean="0"/>
+              <a:t>о вхождении ПКИ в изделия;</a:t>
+            </a:r>
+          </a:p>
+          <a:p>
+            <a:r>
+              <a:rPr lang="ru-RU" dirty="0" smtClean="0"/>
+              <a:t>Текущее </a:t>
+            </a:r>
+            <a:r>
+              <a:rPr lang="ru-RU" dirty="0" smtClean="0"/>
+              <a:t>значение себестоимости.</a:t>
+            </a:r>
+          </a:p>
+          <a:p>
+            <a:endParaRPr lang="ru-RU" dirty="0"/>
+          </a:p>
+        </p:txBody>
+      </p:sp>
+    </p:spTree>
+  </p:cSld>
+  <p:clrMapOvr>
+    <a:masterClrMapping/>
+  </p:clrMapOvr>
+</p:sld>
+</file>
+
+<file path=ppt/slides/slide13.xml><?xml version="1.0" encoding="utf-8"?>
+<p:sld xmlns:a="http://schemas.openxmlformats.org/drawingml/2006/main" xmlns:r="http://schemas.openxmlformats.org/officeDocument/2006/relationships" xmlns:p="http://schemas.openxmlformats.org/presentationml/2006/main">
+  <p:cSld>
+    <p:spTree>
+      <p:nvGrpSpPr>
+        <p:cNvPr id="1" name=""/>
+        <p:cNvGrpSpPr/>
+        <p:nvPr/>
+      </p:nvGrpSpPr>
+      <p:grpSpPr>
+        <a:xfrm>
+          <a:off x="0" y="0"/>
+          <a:ext cx="0" cy="0"/>
+          <a:chOff x="0" y="0"/>
+          <a:chExt cx="0" cy="0"/>
+        </a:xfrm>
+      </p:grpSpPr>
+      <p:sp>
+        <p:nvSpPr>
+          <p:cNvPr id="2" name="Заголовок 1"/>
+          <p:cNvSpPr>
+            <a:spLocks noGrp="1"/>
+          </p:cNvSpPr>
+          <p:nvPr>
+            <p:ph type="title"/>
+          </p:nvPr>
+        </p:nvSpPr>
+        <p:spPr/>
+        <p:txBody>
+          <a:bodyPr>
+            <a:normAutofit fontScale="90000"/>
+          </a:bodyPr>
+          <a:lstStyle/>
+          <a:p>
+            <a:r>
+              <a:rPr lang="ru-RU" dirty="0" smtClean="0"/>
+              <a:t>Используемые материалы и габариты </a:t>
+            </a:r>
+            <a:r>
+              <a:rPr lang="ru-RU" dirty="0" smtClean="0"/>
+              <a:t>деталей</a:t>
+            </a:r>
+            <a:endParaRPr lang="ru-RU" dirty="0"/>
+          </a:p>
+        </p:txBody>
+      </p:sp>
+      <p:sp>
+        <p:nvSpPr>
+          <p:cNvPr id="3" name="Содержимое 2"/>
+          <p:cNvSpPr>
+            <a:spLocks noGrp="1"/>
+          </p:cNvSpPr>
+          <p:nvPr>
+            <p:ph idx="1"/>
+          </p:nvPr>
+        </p:nvSpPr>
+        <p:spPr/>
+        <p:txBody>
+          <a:bodyPr/>
+          <a:lstStyle/>
+          <a:p>
+            <a:pPr>
+              <a:buNone/>
+            </a:pPr>
+            <a:r>
+              <a:rPr lang="ru-RU" dirty="0" smtClean="0"/>
+              <a:t>	</a:t>
+            </a:r>
+            <a:r>
+              <a:rPr lang="ru-RU" dirty="0" smtClean="0"/>
+              <a:t>	Атрибуты для поддержки принятия решений:</a:t>
+            </a:r>
+          </a:p>
+          <a:p>
+            <a:r>
+              <a:rPr lang="ru-RU" dirty="0" smtClean="0"/>
+              <a:t>Значение </a:t>
+            </a:r>
+            <a:r>
+              <a:rPr lang="ru-RU" dirty="0" smtClean="0"/>
+              <a:t>отхода производства;</a:t>
+            </a:r>
+          </a:p>
+          <a:p>
+            <a:r>
+              <a:rPr lang="ru-RU" dirty="0" smtClean="0"/>
+              <a:t>Количество </a:t>
+            </a:r>
+            <a:r>
+              <a:rPr lang="ru-RU" dirty="0" smtClean="0"/>
+              <a:t>заготовок на один раскрой;</a:t>
+            </a:r>
+          </a:p>
+          <a:p>
+            <a:r>
+              <a:rPr lang="ru-RU" dirty="0" smtClean="0"/>
+              <a:t>Плотность</a:t>
+            </a:r>
+            <a:r>
+              <a:rPr lang="ru-RU" dirty="0" smtClean="0"/>
+              <a:t>, прочность, твердость и т.д.</a:t>
+            </a:r>
+          </a:p>
+          <a:p>
+            <a:endParaRPr lang="ru-RU" dirty="0"/>
+          </a:p>
+        </p:txBody>
+      </p:sp>
+    </p:spTree>
+  </p:cSld>
+  <p:clrMapOvr>
+    <a:masterClrMapping/>
+  </p:clrMapOvr>
+</p:sld>
+</file>
+
+<file path=ppt/slides/slide14.xml><?xml version="1.0" encoding="utf-8"?>
+<p:sld xmlns:a="http://schemas.openxmlformats.org/drawingml/2006/main" xmlns:r="http://schemas.openxmlformats.org/officeDocument/2006/relationships" xmlns:p="http://schemas.openxmlformats.org/presentationml/2006/main">
+  <p:cSld>
+    <p:spTree>
+      <p:nvGrpSpPr>
+        <p:cNvPr id="1" name=""/>
+        <p:cNvGrpSpPr/>
+        <p:nvPr/>
+      </p:nvGrpSpPr>
+      <p:grpSpPr>
+        <a:xfrm>
+          <a:off x="0" y="0"/>
+          <a:ext cx="0" cy="0"/>
+          <a:chOff x="0" y="0"/>
+          <a:chExt cx="0" cy="0"/>
+        </a:xfrm>
+      </p:grpSpPr>
+      <p:sp>
+        <p:nvSpPr>
+          <p:cNvPr id="2" name="Заголовок 1"/>
+          <p:cNvSpPr>
+            <a:spLocks noGrp="1"/>
+          </p:cNvSpPr>
+          <p:nvPr>
+            <p:ph type="title"/>
+          </p:nvPr>
+        </p:nvSpPr>
+        <p:spPr/>
+        <p:txBody>
+          <a:bodyPr>
+            <a:normAutofit fontScale="90000"/>
+          </a:bodyPr>
+          <a:lstStyle/>
+          <a:p>
+            <a:r>
+              <a:rPr lang="ru-RU" dirty="0" smtClean="0"/>
+              <a:t>Технологический маршрут изделия</a:t>
+            </a:r>
+            <a:endParaRPr lang="ru-RU" dirty="0"/>
+          </a:p>
+        </p:txBody>
+      </p:sp>
+      <p:sp>
+        <p:nvSpPr>
+          <p:cNvPr id="3" name="Содержимое 2"/>
+          <p:cNvSpPr>
+            <a:spLocks noGrp="1"/>
+          </p:cNvSpPr>
+          <p:nvPr>
+            <p:ph idx="1"/>
+          </p:nvPr>
+        </p:nvSpPr>
+        <p:spPr/>
+        <p:txBody>
+          <a:bodyPr>
+            <a:normAutofit fontScale="92500" lnSpcReduction="20000"/>
+          </a:bodyPr>
+          <a:lstStyle/>
+          <a:p>
+            <a:pPr>
+              <a:buNone/>
+            </a:pPr>
+            <a:r>
+              <a:rPr lang="ru-RU" dirty="0" smtClean="0"/>
+              <a:t>		Технологический </a:t>
+            </a:r>
+            <a:r>
+              <a:rPr lang="ru-RU" dirty="0" smtClean="0"/>
+              <a:t>маршрут может быть использован для принятия решений во многих </a:t>
+            </a:r>
+            <a:r>
+              <a:rPr lang="ru-RU" dirty="0" err="1" smtClean="0"/>
+              <a:t>бизнес-процеесах</a:t>
+            </a:r>
+            <a:r>
+              <a:rPr lang="ru-RU" dirty="0" smtClean="0"/>
+              <a:t>:</a:t>
+            </a:r>
+          </a:p>
+          <a:p>
+            <a:r>
+              <a:rPr lang="ru-RU" dirty="0" smtClean="0"/>
+              <a:t>Планирование </a:t>
+            </a:r>
+            <a:r>
+              <a:rPr lang="ru-RU" dirty="0" smtClean="0"/>
+              <a:t>производства;</a:t>
+            </a:r>
+          </a:p>
+          <a:p>
+            <a:r>
+              <a:rPr lang="ru-RU" dirty="0" smtClean="0"/>
+              <a:t>Распределение </a:t>
+            </a:r>
+            <a:r>
+              <a:rPr lang="ru-RU" dirty="0" smtClean="0"/>
+              <a:t>производственных мощностей;</a:t>
+            </a:r>
+          </a:p>
+          <a:p>
+            <a:r>
+              <a:rPr lang="ru-RU" dirty="0" smtClean="0"/>
+              <a:t>Расчет </a:t>
+            </a:r>
+            <a:r>
+              <a:rPr lang="ru-RU" dirty="0" smtClean="0"/>
+              <a:t>трудоёмкости изделия;</a:t>
+            </a:r>
+          </a:p>
+          <a:p>
+            <a:r>
+              <a:rPr lang="ru-RU" dirty="0" smtClean="0"/>
+              <a:t>Проектирование </a:t>
+            </a:r>
+            <a:r>
+              <a:rPr lang="ru-RU" dirty="0" smtClean="0"/>
+              <a:t>рабочего пространства;</a:t>
+            </a:r>
+          </a:p>
+          <a:p>
+            <a:r>
+              <a:rPr lang="ru-RU" dirty="0" smtClean="0"/>
+              <a:t>Наём </a:t>
+            </a:r>
+            <a:r>
+              <a:rPr lang="ru-RU" dirty="0" smtClean="0"/>
+              <a:t>и подготовка требуемого персонала;</a:t>
+            </a:r>
+          </a:p>
+          <a:p>
+            <a:r>
+              <a:rPr lang="ru-RU" dirty="0" smtClean="0"/>
+              <a:t>Управление </a:t>
+            </a:r>
+            <a:r>
+              <a:rPr lang="ru-RU" dirty="0" smtClean="0"/>
+              <a:t>цеховой и производственной логистикой;</a:t>
+            </a:r>
+          </a:p>
+          <a:p>
+            <a:r>
+              <a:rPr lang="ru-RU" dirty="0" smtClean="0"/>
+              <a:t>Планирование </a:t>
+            </a:r>
+            <a:r>
+              <a:rPr lang="ru-RU" dirty="0" smtClean="0"/>
+              <a:t>складского обеспечения;</a:t>
+            </a:r>
+          </a:p>
+          <a:p>
+            <a:r>
+              <a:rPr lang="ru-RU" dirty="0" smtClean="0"/>
+              <a:t>Подсчет </a:t>
+            </a:r>
+            <a:r>
+              <a:rPr lang="ru-RU" dirty="0" smtClean="0"/>
+              <a:t>выработки по цеху и т.д.</a:t>
+            </a:r>
+          </a:p>
+          <a:p>
+            <a:endParaRPr lang="ru-RU" dirty="0"/>
+          </a:p>
+        </p:txBody>
+      </p:sp>
+    </p:spTree>
+  </p:cSld>
+  <p:clrMapOvr>
+    <a:masterClrMapping/>
+  </p:clrMapOvr>
+</p:sld>
+</file>
+
+<file path=ppt/slides/slide15.xml><?xml version="1.0" encoding="utf-8"?>
+<p:sld xmlns:a="http://schemas.openxmlformats.org/drawingml/2006/main" xmlns:r="http://schemas.openxmlformats.org/officeDocument/2006/relationships" xmlns:p="http://schemas.openxmlformats.org/presentationml/2006/main">
+  <p:cSld>
+    <p:spTree>
+      <p:nvGrpSpPr>
+        <p:cNvPr id="1" name=""/>
+        <p:cNvGrpSpPr/>
+        <p:nvPr/>
+      </p:nvGrpSpPr>
+      <p:grpSpPr>
+        <a:xfrm>
+          <a:off x="0" y="0"/>
+          <a:ext cx="0" cy="0"/>
+          <a:chOff x="0" y="0"/>
+          <a:chExt cx="0" cy="0"/>
+        </a:xfrm>
+      </p:grpSpPr>
+      <p:sp>
+        <p:nvSpPr>
+          <p:cNvPr id="2" name="Заголовок 1"/>
+          <p:cNvSpPr>
+            <a:spLocks noGrp="1"/>
+          </p:cNvSpPr>
+          <p:nvPr>
+            <p:ph type="title"/>
+          </p:nvPr>
+        </p:nvSpPr>
+        <p:spPr/>
+        <p:txBody>
+          <a:bodyPr/>
+          <a:lstStyle/>
+          <a:p>
+            <a:r>
+              <a:rPr lang="ru-RU" dirty="0" smtClean="0"/>
+              <a:t>Управление составом изделия </a:t>
+            </a:r>
+            <a:endParaRPr lang="ru-RU" dirty="0"/>
+          </a:p>
+        </p:txBody>
+      </p:sp>
+      <p:sp>
+        <p:nvSpPr>
+          <p:cNvPr id="3" name="Содержимое 2"/>
+          <p:cNvSpPr>
+            <a:spLocks noGrp="1"/>
+          </p:cNvSpPr>
+          <p:nvPr>
+            <p:ph idx="1"/>
+          </p:nvPr>
+        </p:nvSpPr>
+        <p:spPr/>
+        <p:txBody>
+          <a:bodyPr>
+            <a:normAutofit fontScale="62500" lnSpcReduction="20000"/>
+          </a:bodyPr>
+          <a:lstStyle/>
+          <a:p>
+            <a:pPr>
+              <a:buNone/>
+            </a:pPr>
+            <a:r>
+              <a:rPr lang="ru-RU" dirty="0" smtClean="0"/>
+              <a:t>		В </a:t>
+            </a:r>
+            <a:r>
+              <a:rPr lang="ru-RU" dirty="0" smtClean="0"/>
+              <a:t>общем случае, при производстве могут применяться следующие типы </a:t>
+            </a:r>
+            <a:r>
+              <a:rPr lang="ru-RU" dirty="0" smtClean="0"/>
+              <a:t>объектов:</a:t>
+            </a:r>
+            <a:endParaRPr lang="ru-RU" dirty="0" smtClean="0"/>
+          </a:p>
+          <a:p>
+            <a:pPr lvl="0"/>
+            <a:r>
+              <a:rPr lang="ru-RU" dirty="0" smtClean="0"/>
+              <a:t>Материал – имеются в виду ещё не прошедшие обработку материальные ресурсы;</a:t>
+            </a:r>
+          </a:p>
+          <a:p>
+            <a:pPr lvl="0"/>
+            <a:r>
+              <a:rPr lang="ru-RU" dirty="0" smtClean="0"/>
+              <a:t>Заготовка – материал, с которым были произведены определенные операции;</a:t>
+            </a:r>
+          </a:p>
+          <a:p>
+            <a:pPr lvl="0"/>
+            <a:r>
+              <a:rPr lang="ru-RU" dirty="0" smtClean="0"/>
+              <a:t>Деталь – законченный элемент конструкции;</a:t>
+            </a:r>
+          </a:p>
+          <a:p>
+            <a:pPr lvl="0"/>
+            <a:r>
+              <a:rPr lang="ru-RU" dirty="0" smtClean="0"/>
+              <a:t>Сборочная единица – деталь, в составе которой содержатся другие детали или сборочные единицы;</a:t>
+            </a:r>
+          </a:p>
+          <a:p>
+            <a:pPr lvl="0"/>
+            <a:r>
+              <a:rPr lang="ru-RU" dirty="0" smtClean="0"/>
+              <a:t>Покупное комплектующее изделие – деталь, которая не производится на предприятии, а закупается;</a:t>
+            </a:r>
+          </a:p>
+          <a:p>
+            <a:pPr lvl="0"/>
+            <a:r>
+              <a:rPr lang="ru-RU" dirty="0" smtClean="0"/>
+              <a:t>Инструмент – применяется в том случае, если для изготовления или настройки продукции требуется нестандартное оборудование;</a:t>
+            </a:r>
+          </a:p>
+          <a:p>
+            <a:pPr lvl="0"/>
+            <a:r>
+              <a:rPr lang="ru-RU" dirty="0" smtClean="0"/>
+              <a:t>Документ – сюда относится вся сопроводительная документация, т.е. чертежи, спецификации, технические условия, перечни, инструкции, схемы и т.д</a:t>
+            </a:r>
+            <a:r>
+              <a:rPr lang="ru-RU" dirty="0" smtClean="0"/>
+              <a:t>.</a:t>
+            </a:r>
+            <a:endParaRPr lang="ru-RU" dirty="0" smtClean="0"/>
+          </a:p>
+          <a:p>
+            <a:endParaRPr lang="ru-RU" dirty="0"/>
+          </a:p>
+        </p:txBody>
+      </p:sp>
+    </p:spTree>
+  </p:cSld>
+  <p:clrMapOvr>
+    <a:masterClrMapping/>
+  </p:clrMapOvr>
+</p:sld>
+</file>
+
+<file path=ppt/slides/slide16.xml><?xml version="1.0" encoding="utf-8"?>
+<p:sld xmlns:a="http://schemas.openxmlformats.org/drawingml/2006/main" xmlns:r="http://schemas.openxmlformats.org/officeDocument/2006/relationships" xmlns:p="http://schemas.openxmlformats.org/presentationml/2006/main">
+  <p:cSld>
+    <p:spTree>
+      <p:nvGrpSpPr>
+        <p:cNvPr id="1" name=""/>
+        <p:cNvGrpSpPr/>
+        <p:nvPr/>
+      </p:nvGrpSpPr>
+      <p:grpSpPr>
+        <a:xfrm>
+          <a:off x="0" y="0"/>
+          <a:ext cx="0" cy="0"/>
+          <a:chOff x="0" y="0"/>
+          <a:chExt cx="0" cy="0"/>
+        </a:xfrm>
+      </p:grpSpPr>
+      <p:sp>
+        <p:nvSpPr>
+          <p:cNvPr id="2" name="Заголовок 1"/>
+          <p:cNvSpPr>
+            <a:spLocks noGrp="1"/>
+          </p:cNvSpPr>
+          <p:nvPr>
+            <p:ph type="title"/>
+          </p:nvPr>
+        </p:nvSpPr>
+        <p:spPr/>
+        <p:txBody>
+          <a:bodyPr>
+            <a:normAutofit fontScale="90000"/>
+          </a:bodyPr>
+          <a:lstStyle/>
+          <a:p>
+            <a:r>
+              <a:rPr lang="ru-RU" dirty="0" smtClean="0"/>
+              <a:t>Трудоёмкость </a:t>
+            </a:r>
+            <a:r>
+              <a:rPr lang="ru-RU" dirty="0" smtClean="0"/>
+              <a:t>изделия и требуемый разряд рабочих</a:t>
+            </a:r>
+            <a:endParaRPr lang="ru-RU" dirty="0"/>
+          </a:p>
+        </p:txBody>
+      </p:sp>
+      <p:sp>
+        <p:nvSpPr>
+          <p:cNvPr id="3" name="Содержимое 2"/>
+          <p:cNvSpPr>
+            <a:spLocks noGrp="1"/>
+          </p:cNvSpPr>
+          <p:nvPr>
+            <p:ph idx="1"/>
+          </p:nvPr>
+        </p:nvSpPr>
+        <p:spPr/>
+        <p:txBody>
+          <a:bodyPr/>
+          <a:lstStyle/>
+          <a:p>
+            <a:pPr>
+              <a:buNone/>
+            </a:pPr>
+            <a:r>
+              <a:rPr lang="ru-RU" dirty="0" smtClean="0"/>
+              <a:t>		Используется для расчета и формирования:</a:t>
+            </a:r>
+          </a:p>
+          <a:p>
+            <a:r>
+              <a:rPr lang="ru-RU" dirty="0" smtClean="0"/>
+              <a:t>Зарплат (по цехам, по рабочим, по заказам);</a:t>
+            </a:r>
+          </a:p>
+          <a:p>
+            <a:r>
+              <a:rPr lang="ru-RU" dirty="0" smtClean="0"/>
+              <a:t>Производственного плана;</a:t>
+            </a:r>
+          </a:p>
+          <a:p>
+            <a:r>
+              <a:rPr lang="ru-RU" dirty="0" smtClean="0"/>
+              <a:t>Плана подготовки и набора персонала;</a:t>
+            </a:r>
+          </a:p>
+          <a:p>
+            <a:r>
+              <a:rPr lang="ru-RU" dirty="0" smtClean="0"/>
+              <a:t>Распределение трудовых ресурсов и т.д.</a:t>
+            </a:r>
+          </a:p>
+          <a:p>
+            <a:endParaRPr lang="ru-RU" dirty="0"/>
+          </a:p>
+        </p:txBody>
+      </p:sp>
+    </p:spTree>
+  </p:cSld>
+  <p:clrMapOvr>
+    <a:masterClrMapping/>
+  </p:clrMapOvr>
+</p:sld>
+</file>
+
+<file path=ppt/slides/slide17.xml><?xml version="1.0" encoding="utf-8"?>
+<p:sld xmlns:a="http://schemas.openxmlformats.org/drawingml/2006/main" xmlns:r="http://schemas.openxmlformats.org/officeDocument/2006/relationships" xmlns:p="http://schemas.openxmlformats.org/presentationml/2006/main">
+  <p:cSld>
+    <p:spTree>
+      <p:nvGrpSpPr>
+        <p:cNvPr id="1" name=""/>
+        <p:cNvGrpSpPr/>
+        <p:nvPr/>
+      </p:nvGrpSpPr>
+      <p:grpSpPr>
+        <a:xfrm>
+          <a:off x="0" y="0"/>
+          <a:ext cx="0" cy="0"/>
+          <a:chOff x="0" y="0"/>
+          <a:chExt cx="0" cy="0"/>
+        </a:xfrm>
+      </p:grpSpPr>
+      <p:sp>
+        <p:nvSpPr>
+          <p:cNvPr id="2" name="Заголовок 1"/>
+          <p:cNvSpPr>
+            <a:spLocks noGrp="1"/>
+          </p:cNvSpPr>
+          <p:nvPr>
+            <p:ph type="title"/>
+          </p:nvPr>
+        </p:nvSpPr>
+        <p:spPr/>
+        <p:txBody>
+          <a:bodyPr/>
+          <a:lstStyle/>
+          <a:p>
+            <a:r>
+              <a:rPr lang="ru-RU" dirty="0" smtClean="0"/>
+              <a:t>История изменений</a:t>
+            </a:r>
+            <a:endParaRPr lang="ru-RU" dirty="0"/>
+          </a:p>
+        </p:txBody>
+      </p:sp>
+      <p:sp>
+        <p:nvSpPr>
+          <p:cNvPr id="3" name="Содержимое 2"/>
+          <p:cNvSpPr>
+            <a:spLocks noGrp="1"/>
+          </p:cNvSpPr>
+          <p:nvPr>
+            <p:ph idx="1"/>
+          </p:nvPr>
+        </p:nvSpPr>
+        <p:spPr/>
+        <p:txBody>
+          <a:bodyPr/>
+          <a:lstStyle/>
+          <a:p>
+            <a:pPr>
+              <a:buNone/>
+            </a:pPr>
+            <a:r>
+              <a:rPr lang="ru-RU" dirty="0" smtClean="0"/>
+              <a:t>		Применение:</a:t>
+            </a:r>
+          </a:p>
+          <a:p>
+            <a:r>
+              <a:rPr lang="ru-RU" dirty="0" smtClean="0"/>
+              <a:t>Восстановление предыдущих значений параметров и структуры;</a:t>
+            </a:r>
+          </a:p>
+          <a:p>
+            <a:r>
+              <a:rPr lang="ru-RU" dirty="0" smtClean="0"/>
+              <a:t>Определение обоснованности предыдущих изменений;</a:t>
+            </a:r>
+          </a:p>
+          <a:p>
+            <a:r>
+              <a:rPr lang="ru-RU" dirty="0" smtClean="0"/>
+              <a:t>Установление номера исполнения изделия.</a:t>
+            </a:r>
+            <a:endParaRPr lang="ru-RU" dirty="0"/>
+          </a:p>
+        </p:txBody>
+      </p:sp>
+    </p:spTree>
+  </p:cSld>
+  <p:clrMapOvr>
+    <a:masterClrMapping/>
+  </p:clrMapOvr>
+</p:sld>
+</file>
+
+<file path=ppt/slides/slide18.xml><?xml version="1.0" encoding="utf-8"?>
+<p:sld xmlns:a="http://schemas.openxmlformats.org/drawingml/2006/main" xmlns:r="http://schemas.openxmlformats.org/officeDocument/2006/relationships" xmlns:p="http://schemas.openxmlformats.org/presentationml/2006/main">
+  <p:cSld>
+    <p:spTree>
+      <p:nvGrpSpPr>
+        <p:cNvPr id="1" name=""/>
+        <p:cNvGrpSpPr/>
+        <p:nvPr/>
+      </p:nvGrpSpPr>
+      <p:grpSpPr>
+        <a:xfrm>
+          <a:off x="0" y="0"/>
+          <a:ext cx="0" cy="0"/>
+          <a:chOff x="0" y="0"/>
+          <a:chExt cx="0" cy="0"/>
+        </a:xfrm>
+      </p:grpSpPr>
+      <p:sp>
+        <p:nvSpPr>
+          <p:cNvPr id="2" name="Заголовок 1"/>
+          <p:cNvSpPr>
+            <a:spLocks noGrp="1"/>
+          </p:cNvSpPr>
+          <p:nvPr>
+            <p:ph type="title"/>
+          </p:nvPr>
+        </p:nvSpPr>
+        <p:spPr/>
+        <p:txBody>
+          <a:bodyPr>
+            <a:normAutofit fontScale="90000"/>
+          </a:bodyPr>
+          <a:lstStyle/>
+          <a:p>
+            <a:r>
+              <a:rPr lang="ru-RU" dirty="0" smtClean="0"/>
+              <a:t>Место </a:t>
+            </a:r>
+            <a:r>
+              <a:rPr lang="ru-RU" dirty="0" smtClean="0"/>
+              <a:t>СУЖЦ в информационной среде </a:t>
+            </a:r>
+            <a:r>
+              <a:rPr lang="ru-RU" dirty="0" smtClean="0"/>
+              <a:t>предприятия</a:t>
+            </a:r>
+            <a:endParaRPr lang="ru-RU" dirty="0"/>
+          </a:p>
+        </p:txBody>
+      </p:sp>
+      <p:sp>
+        <p:nvSpPr>
+          <p:cNvPr id="3" name="Содержимое 2"/>
+          <p:cNvSpPr>
+            <a:spLocks noGrp="1"/>
+          </p:cNvSpPr>
+          <p:nvPr>
+            <p:ph idx="1"/>
+          </p:nvPr>
+        </p:nvSpPr>
+        <p:spPr/>
+        <p:txBody>
+          <a:bodyPr>
+            <a:normAutofit fontScale="70000" lnSpcReduction="20000"/>
+          </a:bodyPr>
+          <a:lstStyle/>
+          <a:p>
+            <a:r>
+              <a:rPr lang="ru-RU" dirty="0" smtClean="0"/>
+              <a:t>СУЖЦ</a:t>
+            </a:r>
+            <a:r>
+              <a:rPr lang="en-US" dirty="0" smtClean="0"/>
+              <a:t> </a:t>
+            </a:r>
+            <a:r>
+              <a:rPr lang="ru-RU" dirty="0" smtClean="0"/>
+              <a:t>– </a:t>
+            </a:r>
+            <a:r>
+              <a:rPr lang="ru-RU" dirty="0" smtClean="0"/>
+              <a:t>обеспечение </a:t>
+            </a:r>
+            <a:r>
+              <a:rPr lang="ru-RU" dirty="0" smtClean="0"/>
+              <a:t>ввода информации в хранилище данных и </a:t>
+            </a:r>
+            <a:r>
+              <a:rPr lang="ru-RU" dirty="0" smtClean="0"/>
+              <a:t>предоставление </a:t>
+            </a:r>
+            <a:r>
+              <a:rPr lang="ru-RU" dirty="0" smtClean="0"/>
+              <a:t>удобного пользовательского интерфейса для их модификации. Кроме того, СУЖЦ применяется как "прослойка" между САПР и другими системами предприятия</a:t>
+            </a:r>
+            <a:endParaRPr lang="ru-RU" dirty="0" smtClean="0"/>
+          </a:p>
+          <a:p>
+            <a:r>
+              <a:rPr lang="en-US" dirty="0" smtClean="0"/>
+              <a:t>ERP </a:t>
+            </a:r>
+            <a:r>
+              <a:rPr lang="ru-RU" dirty="0" smtClean="0"/>
+              <a:t>– позволит отслеживать производство и при его анализе улучшать технологический процесс, непосредственно выполняет функции поддержки принятия решений;</a:t>
+            </a:r>
+          </a:p>
+          <a:p>
+            <a:r>
+              <a:rPr lang="ru-RU" dirty="0" smtClean="0"/>
+              <a:t>Электронный </a:t>
+            </a:r>
+            <a:r>
+              <a:rPr lang="ru-RU" dirty="0" smtClean="0"/>
+              <a:t>документооборот – автоматизирует передачу документов между заинтересованными лицами и позволяет избавиться от бумажной документации, что значительно ускорит обращение с изделием;</a:t>
+            </a:r>
+          </a:p>
+          <a:p>
+            <a:r>
+              <a:rPr lang="en-US" dirty="0" smtClean="0"/>
+              <a:t>CRM </a:t>
+            </a:r>
+            <a:r>
+              <a:rPr lang="ru-RU" dirty="0" smtClean="0"/>
+              <a:t>– позволяет настроить общение с потребителями и держателями документации для автоматизации обмена конструкторскими и технологическими данными.</a:t>
+            </a:r>
+          </a:p>
+          <a:p>
+            <a:endParaRPr lang="ru-RU" dirty="0"/>
+          </a:p>
+        </p:txBody>
+      </p:sp>
+    </p:spTree>
+  </p:cSld>
+  <p:clrMapOvr>
+    <a:masterClrMapping/>
+  </p:clrMapOvr>
+</p:sld>
+</file>
+
+<file path=ppt/slides/slide19.xml><?xml version="1.0" encoding="utf-8"?>
+<p:sld xmlns:a="http://schemas.openxmlformats.org/drawingml/2006/main" xmlns:r="http://schemas.openxmlformats.org/officeDocument/2006/relationships" xmlns:p="http://schemas.openxmlformats.org/presentationml/2006/main">
+  <p:cSld>
+    <p:spTree>
+      <p:nvGrpSpPr>
+        <p:cNvPr id="1" name=""/>
+        <p:cNvGrpSpPr/>
+        <p:nvPr/>
+      </p:nvGrpSpPr>
+      <p:grpSpPr>
+        <a:xfrm>
+          <a:off x="0" y="0"/>
+          <a:ext cx="0" cy="0"/>
+          <a:chOff x="0" y="0"/>
+          <a:chExt cx="0" cy="0"/>
+        </a:xfrm>
+      </p:grpSpPr>
+      <p:sp>
+        <p:nvSpPr>
+          <p:cNvPr id="2" name="Заголовок 1"/>
+          <p:cNvSpPr>
+            <a:spLocks noGrp="1"/>
+          </p:cNvSpPr>
+          <p:nvPr>
+            <p:ph type="title"/>
+          </p:nvPr>
+        </p:nvSpPr>
+        <p:spPr/>
+        <p:txBody>
+          <a:bodyPr/>
+          <a:lstStyle/>
+          <a:p>
+            <a:r>
+              <a:rPr lang="ru-RU" dirty="0" smtClean="0"/>
+              <a:t>Выводы:	</a:t>
+            </a:r>
+            <a:endParaRPr lang="ru-RU" dirty="0"/>
+          </a:p>
+        </p:txBody>
+      </p:sp>
+      <p:sp>
+        <p:nvSpPr>
+          <p:cNvPr id="3" name="Содержимое 2"/>
+          <p:cNvSpPr>
+            <a:spLocks noGrp="1"/>
+          </p:cNvSpPr>
+          <p:nvPr>
+            <p:ph idx="1"/>
+          </p:nvPr>
+        </p:nvSpPr>
+        <p:spPr/>
+        <p:txBody>
+          <a:bodyPr>
+            <a:normAutofit fontScale="85000" lnSpcReduction="20000"/>
+          </a:bodyPr>
+          <a:lstStyle/>
+          <a:p>
+            <a:pPr marL="624078" indent="-514350">
+              <a:buFont typeface="+mj-lt"/>
+              <a:buAutoNum type="arabicPeriod"/>
+            </a:pPr>
+            <a:r>
+              <a:rPr lang="ru-RU" dirty="0" smtClean="0"/>
+              <a:t>СУЖЦ отвечают основным требованиям к СППР, но не имеют достаточных средств для анализа и прогнозирования</a:t>
+            </a:r>
+            <a:r>
+              <a:rPr lang="ru-RU" dirty="0" smtClean="0"/>
+              <a:t>.</a:t>
+            </a:r>
+          </a:p>
+          <a:p>
+            <a:pPr marL="624078" indent="-514350">
+              <a:buFont typeface="+mj-lt"/>
+              <a:buAutoNum type="arabicPeriod"/>
+            </a:pPr>
+            <a:r>
+              <a:rPr lang="ru-RU" dirty="0" smtClean="0"/>
+              <a:t>Они </a:t>
+            </a:r>
+            <a:r>
+              <a:rPr lang="ru-RU" dirty="0" smtClean="0"/>
+              <a:t>являются отличным инструментом для подготовки информации для дальнейшего принятия решений, а так же оперативного решения возникающих проблем.</a:t>
+            </a:r>
+          </a:p>
+          <a:p>
+            <a:pPr marL="624078" indent="-514350">
+              <a:buFont typeface="+mj-lt"/>
+              <a:buAutoNum type="arabicPeriod"/>
+            </a:pPr>
+            <a:r>
+              <a:rPr lang="ru-RU" dirty="0" smtClean="0"/>
+              <a:t>Наиболее </a:t>
+            </a:r>
+            <a:r>
+              <a:rPr lang="ru-RU" dirty="0" smtClean="0"/>
+              <a:t>полезными функциями на этапе проектирования являются централизованное управление составом </a:t>
+            </a:r>
+            <a:r>
+              <a:rPr lang="ru-RU" dirty="0" smtClean="0"/>
+              <a:t>изделий и </a:t>
+            </a:r>
+            <a:r>
+              <a:rPr lang="ru-RU" dirty="0" smtClean="0"/>
+              <a:t>технологическим маршрутом</a:t>
+            </a:r>
+            <a:r>
+              <a:rPr lang="ru-RU" dirty="0" smtClean="0"/>
+              <a:t>.</a:t>
+            </a:r>
+          </a:p>
+          <a:p>
+            <a:pPr marL="624078" indent="-514350">
+              <a:buFont typeface="+mj-lt"/>
+              <a:buAutoNum type="arabicPeriod"/>
+            </a:pPr>
+            <a:r>
+              <a:rPr lang="ru-RU" dirty="0" smtClean="0"/>
+              <a:t>СУЖЦ занимает важное место в информационной среде предприятия </a:t>
+            </a:r>
+            <a:endParaRPr lang="ru-RU" dirty="0"/>
+          </a:p>
+        </p:txBody>
+      </p:sp>
+    </p:spTree>
+  </p:cSld>
+  <p:clrMapOvr>
+    <a:masterClrMapping/>
+  </p:clrMapOvr>
+</p:sld>
+</file>
+
 <file path=ppt/slides/slide2.xml><?xml version="1.0" encoding="utf-8"?>
 <p:sld xmlns:a="http://schemas.openxmlformats.org/drawingml/2006/main" xmlns:r="http://schemas.openxmlformats.org/officeDocument/2006/relationships" xmlns:p="http://schemas.openxmlformats.org/presentationml/2006/main">
   <p:cSld>
@@ -6792,6 +8104,86 @@
           </a:p>
           <a:p>
             <a:endParaRPr lang="en-US" dirty="0" smtClean="0"/>
+          </a:p>
+          <a:p>
+            <a:endParaRPr lang="ru-RU" dirty="0"/>
+          </a:p>
+        </p:txBody>
+      </p:sp>
+    </p:spTree>
+  </p:cSld>
+  <p:clrMapOvr>
+    <a:masterClrMapping/>
+  </p:clrMapOvr>
+</p:sld>
+</file>
+
+<file path=ppt/slides/slide20.xml><?xml version="1.0" encoding="utf-8"?>
+<p:sld xmlns:a="http://schemas.openxmlformats.org/drawingml/2006/main" xmlns:r="http://schemas.openxmlformats.org/officeDocument/2006/relationships" xmlns:p="http://schemas.openxmlformats.org/presentationml/2006/main">
+  <p:cSld>
+    <p:spTree>
+      <p:nvGrpSpPr>
+        <p:cNvPr id="1" name=""/>
+        <p:cNvGrpSpPr/>
+        <p:nvPr/>
+      </p:nvGrpSpPr>
+      <p:grpSpPr>
+        <a:xfrm>
+          <a:off x="0" y="0"/>
+          <a:ext cx="0" cy="0"/>
+          <a:chOff x="0" y="0"/>
+          <a:chExt cx="0" cy="0"/>
+        </a:xfrm>
+      </p:grpSpPr>
+      <p:sp>
+        <p:nvSpPr>
+          <p:cNvPr id="4" name="Заголовок 3"/>
+          <p:cNvSpPr>
+            <a:spLocks noGrp="1"/>
+          </p:cNvSpPr>
+          <p:nvPr>
+            <p:ph type="title"/>
+          </p:nvPr>
+        </p:nvSpPr>
+        <p:spPr/>
+        <p:txBody>
+          <a:bodyPr/>
+          <a:lstStyle/>
+          <a:p>
+            <a:r>
+              <a:rPr lang="ru-RU" dirty="0" smtClean="0"/>
+              <a:t>Благодарю за внимание!</a:t>
+            </a:r>
+            <a:endParaRPr lang="ru-RU" dirty="0"/>
+          </a:p>
+        </p:txBody>
+      </p:sp>
+      <p:sp>
+        <p:nvSpPr>
+          <p:cNvPr id="5" name="Текст 4"/>
+          <p:cNvSpPr>
+            <a:spLocks noGrp="1"/>
+          </p:cNvSpPr>
+          <p:nvPr>
+            <p:ph type="body" idx="1"/>
+          </p:nvPr>
+        </p:nvSpPr>
+        <p:spPr/>
+        <p:txBody>
+          <a:bodyPr/>
+          <a:lstStyle/>
+          <a:p>
+            <a:r>
+              <a:rPr lang="ru-RU" dirty="0" smtClean="0"/>
+              <a:t>Автор: Темников А.В., студент группы 521 </a:t>
+            </a:r>
+            <a:endParaRPr lang="en-US" dirty="0" smtClean="0"/>
+          </a:p>
+          <a:p>
+            <a:r>
+              <a:rPr lang="ru-RU" dirty="0" smtClean="0"/>
+              <a:t>Финансового Университета при правительстве Российской Федерации</a:t>
+            </a:r>
           </a:p>
           <a:p>
             <a:endParaRPr lang="ru-RU" dirty="0"/>
@@ -6875,7 +8267,14 @@
                 <a:latin typeface="Times New Roman" pitchFamily="18" charset="0"/>
                 <a:cs typeface="Times New Roman" pitchFamily="18" charset="0"/>
               </a:rPr>
-              <a:t>		PTC </a:t>
+              <a:t>		</a:t>
+            </a:r>
+            <a:r>
+              <a:rPr lang="ru-RU" b="1" dirty="0" smtClean="0">
+                <a:latin typeface="Times New Roman" pitchFamily="18" charset="0"/>
+                <a:cs typeface="Times New Roman" pitchFamily="18" charset="0"/>
+              </a:rPr>
+              <a:t>PTC </a:t>
             </a:r>
             <a:r>
               <a:rPr lang="ru-RU" b="1" dirty="0" err="1" smtClean="0">
@@ -6912,6 +8311,10 @@
               </a:rPr>
               <a:t> позволяет управлять всей информацией о структуре изделия при его разработке – от концепции до утилизации, от изготовления отдельных деталей до сдачи их в эксплуатацию и т.д. </a:t>
             </a:r>
+            <a:endParaRPr lang="ru-RU" dirty="0" smtClean="0">
+              <a:latin typeface="Times New Roman" pitchFamily="18" charset="0"/>
+              <a:cs typeface="Times New Roman" pitchFamily="18" charset="0"/>
+            </a:endParaRPr>
           </a:p>
           <a:p>
             <a:pPr>
@@ -6922,14 +8325,14 @@
                 <a:latin typeface="Times New Roman" pitchFamily="18" charset="0"/>
                 <a:cs typeface="Times New Roman" pitchFamily="18" charset="0"/>
               </a:rPr>
-              <a:t>	</a:t>
+              <a:t>		</a:t>
             </a:r>
             <a:r>
               <a:rPr lang="ru-RU" b="1" dirty="0" smtClean="0">
                 <a:latin typeface="Times New Roman" pitchFamily="18" charset="0"/>
                 <a:cs typeface="Times New Roman" pitchFamily="18" charset="0"/>
               </a:rPr>
-              <a:t>	PTC</a:t>
+              <a:t>PTC</a:t>
             </a:r>
             <a:r>
               <a:rPr lang="ru-RU" dirty="0" smtClean="0">
@@ -7092,18 +8495,22 @@
           <a:p>
             <a:r>
               <a:rPr lang="ru-RU" dirty="0" smtClean="0"/>
-              <a:t>Классификации </a:t>
-            </a:r>
-            <a:r>
-              <a:rPr lang="ru-RU" dirty="0" smtClean="0"/>
-              <a:t>СППР</a:t>
+              <a:t>Классификации СППР</a:t>
+            </a:r>
+            <a:r>
+              <a:rPr lang="ru-RU" dirty="0" smtClean="0"/>
+              <a:t/>
             </a:r>
             <a:br>
               <a:rPr lang="ru-RU" dirty="0" smtClean="0"/>
             </a:br>
             <a:r>
               <a:rPr lang="ru-RU" sz="3100" dirty="0" smtClean="0"/>
-              <a:t>Взаимодействие с пользователем:</a:t>
+              <a:t>Взаимодействие с пользователем</a:t>
+            </a:r>
+            <a:r>
+              <a:rPr lang="ru-RU" sz="3100" dirty="0" smtClean="0"/>
+              <a:t>:</a:t>
             </a:r>
             <a:endParaRPr lang="ru-RU" sz="3100" dirty="0"/>
           </a:p>
@@ -7133,11 +8540,11 @@
             </a:r>
             <a:r>
               <a:rPr lang="ru-RU" dirty="0" smtClean="0"/>
-              <a:t> </a:t>
-            </a:r>
-            <a:r>
-              <a:rPr lang="ru-RU" dirty="0" smtClean="0"/>
-              <a:t>помогают в процессе принятия решений, но не могут выдвинуть конкретного предложения;</a:t>
+              <a:t> помогают в процессе принятия решений, но не могут выдвинуть конкретного предложения</a:t>
+            </a:r>
+            <a:r>
+              <a:rPr lang="ru-RU" dirty="0" smtClean="0"/>
+              <a:t>;</a:t>
             </a:r>
           </a:p>
           <a:p>
@@ -7148,11 +8555,11 @@
             </a:r>
             <a:r>
               <a:rPr lang="ru-RU" dirty="0" smtClean="0"/>
-              <a:t> </a:t>
-            </a:r>
-            <a:r>
-              <a:rPr lang="ru-RU" dirty="0" smtClean="0"/>
-              <a:t>непосредственно участвуют в разработке правильного решения;</a:t>
+              <a:t> непосредственно участвуют в разработке правильного решения</a:t>
+            </a:r>
+            <a:r>
+              <a:rPr lang="ru-RU" dirty="0" smtClean="0"/>
+              <a:t>;</a:t>
             </a:r>
           </a:p>
           <a:p>
@@ -7215,6 +8622,10 @@
               <a:rPr lang="ru-RU" dirty="0" smtClean="0"/>
               <a:t>Классификации СППР</a:t>
             </a:r>
+            <a:r>
+              <a:rPr lang="ru-RU" dirty="0" smtClean="0"/>
+              <a:t/>
+            </a:r>
             <a:br>
               <a:rPr lang="ru-RU" dirty="0" smtClean="0"/>
             </a:br>
@@ -7250,59 +8661,91 @@
             <a:pPr lvl="0"/>
             <a:r>
               <a:rPr lang="ru-RU" b="1" dirty="0" smtClean="0"/>
-              <a:t>Модельно-ориентированные </a:t>
-            </a:r>
+              <a:t>Модельно-ориентированные СППР</a:t>
+            </a:r>
+            <a:r>
+              <a:rPr lang="ru-RU" dirty="0" smtClean="0"/>
+              <a:t>, используют в работе доступ к статистическим, финансовым или иным моделям</a:t>
+            </a:r>
+            <a:r>
+              <a:rPr lang="ru-RU" dirty="0" smtClean="0"/>
+              <a:t>;</a:t>
+            </a:r>
+          </a:p>
+          <a:p>
+            <a:pPr lvl="0"/>
             <a:r>
               <a:rPr lang="ru-RU" b="1" dirty="0" smtClean="0"/>
               <a:t>СППР</a:t>
             </a:r>
             <a:r>
-              <a:rPr lang="ru-RU" dirty="0" smtClean="0"/>
-              <a:t>, используют в работе доступ к статистическим, финансовым или иным моделям;</a:t>
+              <a:rPr lang="ru-RU" b="1" dirty="0" smtClean="0"/>
+              <a:t>, основанные на коммуникациях</a:t>
+            </a:r>
+            <a:r>
+              <a:rPr lang="ru-RU" dirty="0" smtClean="0"/>
+              <a:t>, поддерживают работу двух и более пользователей, занимающихся общей задачей</a:t>
+            </a:r>
+            <a:r>
+              <a:rPr lang="ru-RU" dirty="0" smtClean="0"/>
+              <a:t>;</a:t>
             </a:r>
           </a:p>
           <a:p>
             <a:pPr lvl="0"/>
             <a:r>
               <a:rPr lang="ru-RU" b="1" dirty="0" smtClean="0"/>
-              <a:t>СППР, основанные на коммуникациях</a:t>
-            </a:r>
-            <a:r>
-              <a:rPr lang="ru-RU" dirty="0" smtClean="0"/>
-              <a:t>, поддерживают работу двух и более пользователей, занимающихся общей задачей;</a:t>
+              <a:t>СППР</a:t>
+            </a:r>
+            <a:r>
+              <a:rPr lang="ru-RU" b="1" dirty="0" smtClean="0"/>
+              <a:t>, ориентированные на данные</a:t>
+            </a:r>
+            <a:r>
+              <a:rPr lang="ru-RU" dirty="0" smtClean="0"/>
+              <a:t>, имеют доступ к временным рядам организации. Они используют в работе не только внутренние, но и внешние данные</a:t>
+            </a:r>
+            <a:r>
+              <a:rPr lang="ru-RU" dirty="0" smtClean="0"/>
+              <a:t>;</a:t>
             </a:r>
           </a:p>
           <a:p>
             <a:pPr lvl="0"/>
             <a:r>
               <a:rPr lang="ru-RU" b="1" dirty="0" smtClean="0"/>
-              <a:t>СППР, ориентированные на данные</a:t>
-            </a:r>
-            <a:r>
-              <a:rPr lang="ru-RU" dirty="0" smtClean="0"/>
-              <a:t>, имеют доступ к временным рядам организации. Они используют в работе не только внутренние, но и внешние данные;</a:t>
+              <a:t>СППР</a:t>
+            </a:r>
+            <a:r>
+              <a:rPr lang="ru-RU" b="1" dirty="0" smtClean="0"/>
+              <a:t>, ориентированные на документы</a:t>
+            </a:r>
+            <a:r>
+              <a:rPr lang="ru-RU" dirty="0" smtClean="0"/>
+              <a:t>, манипулируют неструктурированной информацией, заключенной в различных электронных форматах</a:t>
+            </a:r>
+            <a:r>
+              <a:rPr lang="ru-RU" dirty="0" smtClean="0"/>
+              <a:t>;</a:t>
             </a:r>
           </a:p>
           <a:p>
             <a:pPr lvl="0"/>
             <a:r>
               <a:rPr lang="ru-RU" b="1" dirty="0" smtClean="0"/>
-              <a:t>СППР, ориентированные на документы</a:t>
-            </a:r>
-            <a:r>
-              <a:rPr lang="ru-RU" dirty="0" smtClean="0"/>
-              <a:t>, манипулируют неструктурированной информацией, заключенной в различных электронных форматах;</a:t>
-            </a:r>
-          </a:p>
-          <a:p>
-            <a:pPr lvl="0"/>
+              <a:t>СППР</a:t>
+            </a:r>
             <a:r>
               <a:rPr lang="ru-RU" b="1" dirty="0" smtClean="0"/>
-              <a:t>СППР, ориентированные на знания</a:t>
-            </a:r>
-            <a:r>
-              <a:rPr lang="ru-RU" dirty="0" smtClean="0"/>
-              <a:t>, предоставляют специализированные решения проблем, основанные на фактах.</a:t>
+              <a:t>, ориентированные на знания</a:t>
+            </a:r>
+            <a:r>
+              <a:rPr lang="ru-RU" dirty="0" smtClean="0"/>
+              <a:t>, предоставляют специализированные решения проблем, основанные на фактах</a:t>
+            </a:r>
+            <a:r>
+              <a:rPr lang="ru-RU" dirty="0" smtClean="0"/>
+              <a:t>.</a:t>
             </a:r>
           </a:p>
           <a:p>
@@ -7361,11 +8804,7 @@
             </a:br>
             <a:r>
               <a:rPr lang="ru-RU" dirty="0" smtClean="0"/>
-              <a:t>Классификации </a:t>
-            </a:r>
-            <a:r>
-              <a:rPr lang="ru-RU" dirty="0" smtClean="0"/>
-              <a:t>СППР </a:t>
+              <a:t>Классификации СППР </a:t>
             </a:r>
             <a:r>
               <a:rPr lang="ru-RU" dirty="0" smtClean="0"/>
@@ -7376,11 +8815,11 @@
             </a:br>
             <a:r>
               <a:rPr lang="ru-RU" sz="3100" dirty="0" smtClean="0"/>
-              <a:t>По </a:t>
+              <a:t>По сфере использования выделяют</a:t>
             </a:r>
             <a:r>
               <a:rPr lang="ru-RU" sz="3100" dirty="0" smtClean="0"/>
-              <a:t>сфере использования выделяют:</a:t>
+              <a:t>:</a:t>
             </a:r>
             <a:r>
               <a:rPr lang="ru-RU" dirty="0" smtClean="0"/>
@@ -7414,11 +8853,7 @@
             </a:r>
             <a:r>
               <a:rPr lang="ru-RU" dirty="0" smtClean="0"/>
-              <a:t>работают с </a:t>
-            </a:r>
-            <a:r>
-              <a:rPr lang="ru-RU" dirty="0" smtClean="0"/>
-              <a:t>большими системами хранения данных и применяются многими пользователями. </a:t>
+              <a:t>работают с большими системами хранения данных и применяются многими пользователями. </a:t>
             </a:r>
             <a:endParaRPr lang="ru-RU" b="1" dirty="0" smtClean="0"/>
           </a:p>
@@ -7430,11 +8865,11 @@
             </a:r>
             <a:r>
               <a:rPr lang="ru-RU" dirty="0" smtClean="0"/>
-              <a:t>являются </a:t>
-            </a:r>
-            <a:r>
-              <a:rPr lang="ru-RU" dirty="0" smtClean="0"/>
-              <a:t>небольшими системами и подходят для управления с персонального компьютера одного пользователя.</a:t>
+              <a:t>являются небольшими системами и подходят для управления с персонального компьютера одного пользователя</a:t>
+            </a:r>
+            <a:r>
+              <a:rPr lang="ru-RU" dirty="0" smtClean="0"/>
+              <a:t>.</a:t>
             </a:r>
             <a:endParaRPr lang="ru-RU" b="1" dirty="0" smtClean="0"/>
           </a:p>
@@ -7480,29 +8915,566 @@
         </p:nvSpPr>
         <p:spPr/>
         <p:txBody>
+          <a:bodyPr>
+            <a:normAutofit fontScale="90000"/>
+          </a:bodyPr>
+          <a:lstStyle/>
+          <a:p>
+            <a:pPr lvl="0"/>
+            <a:r>
+              <a:rPr lang="ru-RU" dirty="0" smtClean="0"/>
+              <a:t>Структура СППР</a:t>
+            </a:r>
+            <a:r>
+              <a:rPr lang="ru-RU" dirty="0" smtClean="0"/>
+              <a:t/>
+            </a:r>
+            <a:br>
+              <a:rPr lang="ru-RU" dirty="0" smtClean="0"/>
+            </a:br>
+            <a:r>
+              <a:rPr lang="ru-RU" sz="3100" dirty="0" smtClean="0"/>
+              <a:t>Информационные хранилища данных</a:t>
+            </a:r>
+            <a:endParaRPr lang="ru-RU" dirty="0"/>
+          </a:p>
+        </p:txBody>
+      </p:sp>
+      <p:sp>
+        <p:nvSpPr>
+          <p:cNvPr id="4" name="Содержимое 3"/>
+          <p:cNvSpPr>
+            <a:spLocks noGrp="1"/>
+          </p:cNvSpPr>
+          <p:nvPr>
+            <p:ph sz="half" idx="1"/>
+          </p:nvPr>
+        </p:nvSpPr>
+        <p:spPr/>
+        <p:txBody>
+          <a:bodyPr>
+            <a:normAutofit fontScale="92500" lnSpcReduction="20000"/>
+          </a:bodyPr>
+          <a:lstStyle/>
+          <a:p>
+            <a:pPr>
+              <a:buNone/>
+            </a:pPr>
+            <a:r>
+              <a:rPr lang="ru-RU" dirty="0" smtClean="0"/>
+              <a:t>	</a:t>
+            </a:r>
+            <a:r>
+              <a:rPr lang="ru-RU" dirty="0" smtClean="0"/>
+              <a:t>	</a:t>
+            </a:r>
+            <a:r>
+              <a:rPr lang="ru-RU" b="1" dirty="0" smtClean="0"/>
+              <a:t>Информационные хранилища данных </a:t>
+            </a:r>
+            <a:r>
+              <a:rPr lang="ru-RU" dirty="0" smtClean="0"/>
+              <a:t>– это предметно-ориентированные, интегрированные, неизменные, поддерживающие хронологию наборы данных, организованные для целей поддержки управления, призванные выступать в роли единого и единственного источника истины, обеспечивающего менеджеров и аналитиков достоверной информацией, необходимой для оперативного анализа и принятия решений.</a:t>
+            </a:r>
+            <a:endParaRPr lang="ru-RU" dirty="0"/>
+          </a:p>
+        </p:txBody>
+      </p:sp>
+      <p:sp>
+        <p:nvSpPr>
+          <p:cNvPr id="5" name="Содержимое 4"/>
+          <p:cNvSpPr>
+            <a:spLocks noGrp="1"/>
+          </p:cNvSpPr>
+          <p:nvPr>
+            <p:ph sz="half" idx="2"/>
+          </p:nvPr>
+        </p:nvSpPr>
+        <p:spPr/>
+        <p:txBody>
+          <a:bodyPr>
+            <a:normAutofit fontScale="92500" lnSpcReduction="20000"/>
+          </a:bodyPr>
+          <a:lstStyle/>
+          <a:p>
+            <a:r>
+              <a:rPr lang="ru-RU" b="1" dirty="0" smtClean="0"/>
+              <a:t>Объектно-реляционная СУБД</a:t>
+            </a:r>
+            <a:r>
+              <a:rPr lang="ru-RU" dirty="0" smtClean="0"/>
+              <a:t> — реляционная СУБД поддерживающая некоторые технологии, реализующие объектно-ориентированный подход: </a:t>
+            </a:r>
+            <a:r>
+              <a:rPr lang="ru-RU" b="1" dirty="0" smtClean="0"/>
+              <a:t>объекты</a:t>
+            </a:r>
+            <a:r>
+              <a:rPr lang="ru-RU" dirty="0" smtClean="0"/>
+              <a:t>, </a:t>
+            </a:r>
+            <a:r>
+              <a:rPr lang="ru-RU" b="1" dirty="0" smtClean="0"/>
+              <a:t>классы</a:t>
+            </a:r>
+            <a:r>
+              <a:rPr lang="ru-RU" dirty="0" smtClean="0"/>
+              <a:t> и </a:t>
+            </a:r>
+            <a:r>
+              <a:rPr lang="ru-RU" b="1" dirty="0" smtClean="0"/>
+              <a:t>наследование</a:t>
+            </a:r>
+            <a:r>
+              <a:rPr lang="ru-RU" dirty="0" smtClean="0"/>
+              <a:t> реализованы в структуре баз данных и языке запросов.</a:t>
+            </a:r>
+          </a:p>
+          <a:p>
+            <a:r>
+              <a:rPr lang="ru-RU" dirty="0" smtClean="0"/>
+              <a:t>Термин </a:t>
+            </a:r>
+            <a:r>
+              <a:rPr lang="ru-RU" b="1" dirty="0" smtClean="0"/>
+              <a:t>«</a:t>
+            </a:r>
+            <a:r>
+              <a:rPr lang="ru-RU" b="1" dirty="0" smtClean="0"/>
+              <a:t>реляционный</a:t>
+            </a:r>
+            <a:r>
+              <a:rPr lang="ru-RU" b="1" dirty="0" smtClean="0"/>
+              <a:t>» </a:t>
+            </a:r>
+            <a:r>
+              <a:rPr lang="ru-RU" dirty="0" smtClean="0"/>
+              <a:t>означает, что теория основана на математическом понятии </a:t>
+            </a:r>
+            <a:r>
+              <a:rPr lang="ru-RU" b="1" dirty="0" smtClean="0"/>
+              <a:t>отношение</a:t>
+            </a:r>
+            <a:r>
+              <a:rPr lang="ru-RU" dirty="0" smtClean="0"/>
+              <a:t> (</a:t>
+            </a:r>
+            <a:r>
+              <a:rPr lang="ru-RU" i="1" dirty="0" err="1" smtClean="0"/>
+              <a:t>relation</a:t>
+            </a:r>
+            <a:r>
+              <a:rPr lang="ru-RU" dirty="0" smtClean="0"/>
+              <a:t>). В качестве неформального синонима термину «отношение» часто встречается слово </a:t>
+            </a:r>
+            <a:r>
+              <a:rPr lang="ru-RU" b="1" dirty="0" smtClean="0"/>
+              <a:t>таблица</a:t>
+            </a:r>
+            <a:r>
+              <a:rPr lang="ru-RU" dirty="0" smtClean="0"/>
+              <a:t>.</a:t>
+            </a:r>
+            <a:endParaRPr lang="ru-RU" dirty="0"/>
+          </a:p>
+        </p:txBody>
+      </p:sp>
+    </p:spTree>
+  </p:cSld>
+  <p:clrMapOvr>
+    <a:masterClrMapping/>
+  </p:clrMapOvr>
+</p:sld>
+</file>
+
+<file path=ppt/slides/slide8.xml><?xml version="1.0" encoding="utf-8"?>
+<p:sld xmlns:a="http://schemas.openxmlformats.org/drawingml/2006/main" xmlns:r="http://schemas.openxmlformats.org/officeDocument/2006/relationships" xmlns:p="http://schemas.openxmlformats.org/presentationml/2006/main">
+  <p:cSld>
+    <p:spTree>
+      <p:nvGrpSpPr>
+        <p:cNvPr id="1" name=""/>
+        <p:cNvGrpSpPr/>
+        <p:nvPr/>
+      </p:nvGrpSpPr>
+      <p:grpSpPr>
+        <a:xfrm>
+          <a:off x="0" y="0"/>
+          <a:ext cx="0" cy="0"/>
+          <a:chOff x="0" y="0"/>
+          <a:chExt cx="0" cy="0"/>
+        </a:xfrm>
+      </p:grpSpPr>
+      <p:sp>
+        <p:nvSpPr>
+          <p:cNvPr id="2" name="Заголовок 1"/>
+          <p:cNvSpPr>
+            <a:spLocks noGrp="1"/>
+          </p:cNvSpPr>
+          <p:nvPr>
+            <p:ph type="title"/>
+          </p:nvPr>
+        </p:nvSpPr>
+        <p:spPr/>
+        <p:txBody>
+          <a:bodyPr>
+            <a:normAutofit fontScale="90000"/>
+          </a:bodyPr>
+          <a:lstStyle/>
+          <a:p>
+            <a:r>
+              <a:rPr lang="ru-RU" dirty="0" smtClean="0"/>
+              <a:t>Структура СППР</a:t>
+            </a:r>
+            <a:r>
+              <a:rPr lang="ru-RU" dirty="0" smtClean="0"/>
+              <a:t/>
+            </a:r>
+            <a:br>
+              <a:rPr lang="ru-RU" dirty="0" smtClean="0"/>
+            </a:br>
+            <a:r>
+              <a:rPr lang="ru-RU" sz="3100" dirty="0" smtClean="0"/>
+              <a:t>Средства и методы извлечения, обработки и загрузки данных (</a:t>
+            </a:r>
+            <a:r>
+              <a:rPr lang="ru-RU" sz="3100" dirty="0" smtClean="0"/>
+              <a:t>ETL</a:t>
+            </a:r>
+            <a:r>
+              <a:rPr lang="ru-RU" sz="3100" dirty="0" smtClean="0"/>
+              <a:t>)</a:t>
+            </a:r>
+            <a:r>
+              <a:rPr lang="ru-RU" dirty="0" smtClean="0"/>
+              <a:t/>
+            </a:r>
+            <a:br>
+              <a:rPr lang="ru-RU" dirty="0" smtClean="0"/>
+            </a:br>
+            <a:endParaRPr lang="ru-RU" dirty="0"/>
+          </a:p>
+        </p:txBody>
+      </p:sp>
+      <p:sp>
+        <p:nvSpPr>
+          <p:cNvPr id="3" name="Содержимое 2"/>
+          <p:cNvSpPr>
+            <a:spLocks noGrp="1"/>
+          </p:cNvSpPr>
+          <p:nvPr>
+            <p:ph idx="1"/>
+          </p:nvPr>
+        </p:nvSpPr>
+        <p:spPr/>
+        <p:txBody>
           <a:bodyPr/>
           <a:lstStyle/>
           <a:p>
-            <a:endParaRPr lang="ru-RU"/>
-          </a:p>
-        </p:txBody>
-      </p:sp>
-      <p:sp>
-        <p:nvSpPr>
-          <p:cNvPr id="3" name="Содержимое 2"/>
-          <p:cNvSpPr>
-            <a:spLocks noGrp="1"/>
-          </p:cNvSpPr>
-          <p:nvPr>
-            <p:ph idx="1"/>
+            <a:pPr>
+              <a:buNone/>
+            </a:pPr>
+            <a:r>
+              <a:rPr lang="en-US" dirty="0" smtClean="0"/>
+              <a:t>		</a:t>
+            </a:r>
+            <a:r>
+              <a:rPr lang="ru-RU" b="1" dirty="0" smtClean="0"/>
+              <a:t>ETL</a:t>
+            </a:r>
+            <a:r>
+              <a:rPr lang="ru-RU" dirty="0" smtClean="0"/>
+              <a:t> – аббревиатура от </a:t>
+            </a:r>
+            <a:r>
+              <a:rPr lang="ru-RU" b="1" dirty="0" err="1" smtClean="0"/>
+              <a:t>Extract</a:t>
+            </a:r>
+            <a:r>
+              <a:rPr lang="ru-RU" b="1" dirty="0" smtClean="0"/>
+              <a:t> </a:t>
+            </a:r>
+            <a:r>
+              <a:rPr lang="ru-RU" dirty="0" smtClean="0"/>
+              <a:t>(извлечь), </a:t>
+            </a:r>
+            <a:r>
+              <a:rPr lang="ru-RU" b="1" dirty="0" err="1" smtClean="0"/>
+              <a:t>Transform</a:t>
+            </a:r>
+            <a:r>
+              <a:rPr lang="ru-RU" b="1" dirty="0" smtClean="0"/>
+              <a:t> </a:t>
+            </a:r>
+            <a:r>
+              <a:rPr lang="ru-RU" dirty="0" smtClean="0"/>
+              <a:t>(изменить), </a:t>
+            </a:r>
+            <a:r>
+              <a:rPr lang="ru-RU" b="1" dirty="0" err="1" smtClean="0"/>
+              <a:t>Load</a:t>
+            </a:r>
+            <a:r>
+              <a:rPr lang="ru-RU" b="1" dirty="0" smtClean="0"/>
+              <a:t> </a:t>
+            </a:r>
+            <a:r>
+              <a:rPr lang="ru-RU" dirty="0" smtClean="0"/>
+              <a:t>(загрузить). Это системы корпоративного класса, которые применяются, чтобы привести к одним справочникам и загрузить в</a:t>
+            </a:r>
+            <a:r>
+              <a:rPr lang="en-US" dirty="0" smtClean="0"/>
+              <a:t> </a:t>
+            </a:r>
+            <a:r>
+              <a:rPr lang="ru-RU" dirty="0" smtClean="0"/>
+              <a:t>хранилище данных информацию из нескольких разных учетных систем</a:t>
+            </a:r>
+            <a:r>
+              <a:rPr lang="ru-RU" dirty="0" smtClean="0"/>
+              <a:t>.</a:t>
+            </a:r>
+            <a:endParaRPr lang="ru-RU" dirty="0"/>
+          </a:p>
+        </p:txBody>
+      </p:sp>
+    </p:spTree>
+  </p:cSld>
+  <p:clrMapOvr>
+    <a:masterClrMapping/>
+  </p:clrMapOvr>
+</p:sld>
+</file>
+
+<file path=ppt/slides/slide9.xml><?xml version="1.0" encoding="utf-8"?>
+<p:sld xmlns:a="http://schemas.openxmlformats.org/drawingml/2006/main" xmlns:r="http://schemas.openxmlformats.org/officeDocument/2006/relationships" xmlns:p="http://schemas.openxmlformats.org/presentationml/2006/main">
+  <p:cSld>
+    <p:spTree>
+      <p:nvGrpSpPr>
+        <p:cNvPr id="1" name=""/>
+        <p:cNvGrpSpPr/>
+        <p:nvPr/>
+      </p:nvGrpSpPr>
+      <p:grpSpPr>
+        <a:xfrm>
+          <a:off x="0" y="0"/>
+          <a:ext cx="0" cy="0"/>
+          <a:chOff x="0" y="0"/>
+          <a:chExt cx="0" cy="0"/>
+        </a:xfrm>
+      </p:grpSpPr>
+      <p:sp>
+        <p:nvSpPr>
+          <p:cNvPr id="2" name="Заголовок 1"/>
+          <p:cNvSpPr>
+            <a:spLocks noGrp="1"/>
+          </p:cNvSpPr>
+          <p:nvPr>
+            <p:ph type="title"/>
           </p:nvPr>
         </p:nvSpPr>
         <p:spPr/>
         <p:txBody>
-          <a:bodyPr/>
-          <a:lstStyle/>
-          <a:p>
-            <a:endParaRPr lang="ru-RU"/>
+          <a:bodyPr>
+            <a:normAutofit fontScale="90000"/>
+          </a:bodyPr>
+          <a:lstStyle/>
+          <a:p>
+            <a:pPr lvl="0"/>
+            <a:r>
+              <a:rPr lang="ru-RU" dirty="0" smtClean="0"/>
+              <a:t>Структура СППР</a:t>
+            </a:r>
+            <a:br>
+              <a:rPr lang="ru-RU" dirty="0" smtClean="0"/>
+            </a:br>
+            <a:r>
+              <a:rPr lang="ru-RU" dirty="0" smtClean="0"/>
+              <a:t>М</a:t>
+            </a:r>
+            <a:r>
+              <a:rPr lang="ru-RU" sz="3100" dirty="0" smtClean="0"/>
+              <a:t>ногомерная БД и средства анализа OLAP</a:t>
+            </a:r>
+            <a:r>
+              <a:rPr lang="ru-RU" sz="3100" dirty="0" smtClean="0"/>
+              <a:t>;</a:t>
+            </a:r>
+            <a:br>
+              <a:rPr lang="ru-RU" sz="3100" dirty="0" smtClean="0"/>
+            </a:br>
+            <a:r>
+              <a:rPr lang="ru-RU" sz="3100" dirty="0" smtClean="0"/>
+              <a:t>Средства </a:t>
+            </a:r>
+            <a:r>
+              <a:rPr lang="ru-RU" sz="3100" dirty="0" err="1" smtClean="0"/>
+              <a:t>Data</a:t>
+            </a:r>
+            <a:r>
+              <a:rPr lang="ru-RU" sz="3100" dirty="0" smtClean="0"/>
+              <a:t> </a:t>
+            </a:r>
+            <a:r>
+              <a:rPr lang="ru-RU" sz="3100" dirty="0" err="1" smtClean="0"/>
+              <a:t>Mining</a:t>
+            </a:r>
+            <a:r>
+              <a:rPr lang="ru-RU" sz="3100" dirty="0" smtClean="0"/>
+              <a:t>.</a:t>
+            </a:r>
+            <a:endParaRPr lang="ru-RU" sz="3100" dirty="0"/>
+          </a:p>
+        </p:txBody>
+      </p:sp>
+      <p:sp>
+        <p:nvSpPr>
+          <p:cNvPr id="8" name="Содержимое 7"/>
+          <p:cNvSpPr>
+            <a:spLocks noGrp="1"/>
+          </p:cNvSpPr>
+          <p:nvPr>
+            <p:ph sz="half" idx="1"/>
+          </p:nvPr>
+        </p:nvSpPr>
+        <p:spPr>
+          <a:xfrm>
+            <a:off x="457200" y="2428868"/>
+            <a:ext cx="4043362" cy="4346519"/>
+          </a:xfrm>
+        </p:spPr>
+        <p:txBody>
+          <a:bodyPr>
+            <a:normAutofit fontScale="85000" lnSpcReduction="10000"/>
+          </a:bodyPr>
+          <a:lstStyle/>
+          <a:p>
+            <a:pPr>
+              <a:buNone/>
+            </a:pPr>
+            <a:r>
+              <a:rPr lang="en-US" dirty="0" smtClean="0"/>
+              <a:t>		</a:t>
+            </a:r>
+            <a:r>
+              <a:rPr lang="ru-RU" b="1" dirty="0" smtClean="0"/>
+              <a:t> OLAP</a:t>
+            </a:r>
+            <a:r>
+              <a:rPr lang="ru-RU" dirty="0" smtClean="0"/>
+              <a:t> (</a:t>
+            </a:r>
+            <a:r>
+              <a:rPr lang="ru-RU" dirty="0" smtClean="0"/>
+              <a:t>англ</a:t>
+            </a:r>
+            <a:r>
+              <a:rPr lang="ru-RU" dirty="0" smtClean="0"/>
+              <a:t>. </a:t>
+            </a:r>
+            <a:r>
+              <a:rPr lang="ru-RU" dirty="0" err="1" smtClean="0"/>
+              <a:t>online</a:t>
+            </a:r>
+            <a:r>
+              <a:rPr lang="ru-RU" dirty="0" smtClean="0"/>
+              <a:t> </a:t>
+            </a:r>
+            <a:r>
+              <a:rPr lang="ru-RU" dirty="0" err="1" smtClean="0"/>
+              <a:t>analytical</a:t>
+            </a:r>
+            <a:r>
+              <a:rPr lang="ru-RU" dirty="0" smtClean="0"/>
+              <a:t> </a:t>
+            </a:r>
+            <a:r>
+              <a:rPr lang="ru-RU" dirty="0" err="1" smtClean="0"/>
+              <a:t>processing</a:t>
+            </a:r>
+            <a:r>
+              <a:rPr lang="ru-RU" dirty="0" smtClean="0"/>
+              <a:t>, аналитическая обработка в реальном времени) — технология обработки данных, заключающаяся в подготовке суммарной (</a:t>
+            </a:r>
+            <a:r>
+              <a:rPr lang="ru-RU" dirty="0" smtClean="0"/>
+              <a:t>агрегированной</a:t>
+            </a:r>
+            <a:r>
+              <a:rPr lang="ru-RU" dirty="0" smtClean="0"/>
+              <a:t>) информации на основе больших массивов данных, структурированных по многомерному принципу</a:t>
+            </a:r>
+            <a:r>
+              <a:rPr lang="ru-RU" dirty="0" smtClean="0"/>
+              <a:t>.</a:t>
+            </a:r>
+            <a:endParaRPr lang="ru-RU" dirty="0" smtClean="0"/>
+          </a:p>
+          <a:p>
+            <a:pPr>
+              <a:buNone/>
+            </a:pPr>
+            <a:r>
+              <a:rPr lang="ru-RU" dirty="0" smtClean="0"/>
+              <a:t>		Многомерное моделирование предусматривает использование измерений для предоставления максимально возможного контекста для фактов  модели.</a:t>
+            </a:r>
+            <a:endParaRPr lang="ru-RU" dirty="0"/>
+          </a:p>
+        </p:txBody>
+      </p:sp>
+      <p:sp>
+        <p:nvSpPr>
+          <p:cNvPr id="9" name="Содержимое 8"/>
+          <p:cNvSpPr>
+            <a:spLocks noGrp="1"/>
+          </p:cNvSpPr>
+          <p:nvPr>
+            <p:ph sz="half" idx="2"/>
+          </p:nvPr>
+        </p:nvSpPr>
+        <p:spPr>
+          <a:xfrm>
+            <a:off x="4648200" y="2428868"/>
+            <a:ext cx="4067204" cy="4346519"/>
+          </a:xfrm>
+        </p:spPr>
+        <p:txBody>
+          <a:bodyPr>
+            <a:normAutofit fontScale="85000" lnSpcReduction="10000"/>
+          </a:bodyPr>
+          <a:lstStyle/>
+          <a:p>
+            <a:pPr>
+              <a:buNone/>
+            </a:pPr>
+            <a:r>
+              <a:rPr lang="ru-RU" b="1" dirty="0" smtClean="0"/>
+              <a:t>		</a:t>
+            </a:r>
+            <a:r>
+              <a:rPr lang="ru-RU" b="1" dirty="0" err="1" smtClean="0"/>
+              <a:t>Data</a:t>
+            </a:r>
+            <a:r>
+              <a:rPr lang="ru-RU" b="1" dirty="0" smtClean="0"/>
+              <a:t> </a:t>
+            </a:r>
+            <a:r>
+              <a:rPr lang="ru-RU" b="1" dirty="0" err="1" smtClean="0"/>
+              <a:t>Mining</a:t>
+            </a:r>
+            <a:r>
+              <a:rPr lang="ru-RU" dirty="0" smtClean="0"/>
+              <a:t> (</a:t>
+            </a:r>
+            <a:r>
+              <a:rPr lang="ru-RU" dirty="0" smtClean="0"/>
+              <a:t>рус</a:t>
+            </a:r>
+            <a:r>
+              <a:rPr lang="ru-RU" dirty="0" smtClean="0"/>
+              <a:t>. добыча данных, интеллектуальный анализ данных, глубинный анализ данных) — собирательное название, используемое для обозначения совокупности методов обнаружения в данных ранее неизвестных, нетривиальных, практически полезных и доступных интерпретации знаний, необходимых для принятия решений в различных ...</a:t>
+            </a:r>
+            <a:endParaRPr lang="ru-RU" dirty="0"/>
           </a:p>
         </p:txBody>
       </p:sp>

</xml_diff>